<commit_message>
Rough draft up to Results
</commit_message>
<xml_diff>
--- a/Report/Extended GNSS.pptx
+++ b/Report/Extended GNSS.pptx
@@ -678,6 +678,453 @@
     </a:lvl9pPr>
   </p:notesStyle>
 </p:notesMaster>
+</file>
+
+<file path=ppt/notesSlides/notesSlide1.xml><?xml version="1.0" encoding="utf-8"?>
+<p:notes xmlns:a="http://schemas.openxmlformats.org/drawingml/2006/main" xmlns:r="http://schemas.openxmlformats.org/officeDocument/2006/relationships" xmlns:p="http://schemas.openxmlformats.org/presentationml/2006/main">
+  <p:cSld>
+    <p:spTree>
+      <p:nvGrpSpPr>
+        <p:cNvPr id="1" name=""/>
+        <p:cNvGrpSpPr/>
+        <p:nvPr/>
+      </p:nvGrpSpPr>
+      <p:grpSpPr>
+        <a:xfrm>
+          <a:off x="0" y="0"/>
+          <a:ext cx="0" cy="0"/>
+          <a:chOff x="0" y="0"/>
+          <a:chExt cx="0" cy="0"/>
+        </a:xfrm>
+      </p:grpSpPr>
+      <p:sp>
+        <p:nvSpPr>
+          <p:cNvPr id="2" name="Slide Image Placeholder 1"/>
+          <p:cNvSpPr>
+            <a:spLocks noGrp="1" noRot="1" noChangeAspect="1"/>
+          </p:cNvSpPr>
+          <p:nvPr>
+            <p:ph type="sldImg"/>
+          </p:nvPr>
+        </p:nvSpPr>
+        <p:spPr/>
+      </p:sp>
+      <p:sp>
+        <p:nvSpPr>
+          <p:cNvPr id="3" name="Notes Placeholder 2"/>
+          <p:cNvSpPr>
+            <a:spLocks noGrp="1"/>
+          </p:cNvSpPr>
+          <p:nvPr>
+            <p:ph type="body" idx="1"/>
+          </p:nvPr>
+        </p:nvSpPr>
+        <p:spPr/>
+        <p:txBody>
+          <a:bodyPr/>
+          <a:lstStyle/>
+          <a:p>
+            <a:r>
+              <a:rPr lang="en-US" dirty="0" smtClean="0"/>
+              <a:t>Maybe add hemisphere graphic,</a:t>
+            </a:r>
+            <a:r>
+              <a:rPr lang="en-US" baseline="0" dirty="0" smtClean="0"/>
+              <a:t> or emitted power from SSV #19, cite GNSS satellite geometry and attitude models</a:t>
+            </a:r>
+            <a:endParaRPr lang="en-US" dirty="0"/>
+          </a:p>
+        </p:txBody>
+      </p:sp>
+      <p:sp>
+        <p:nvSpPr>
+          <p:cNvPr id="4" name="Slide Number Placeholder 3"/>
+          <p:cNvSpPr>
+            <a:spLocks noGrp="1"/>
+          </p:cNvSpPr>
+          <p:nvPr>
+            <p:ph type="sldNum" sz="quarter" idx="10"/>
+          </p:nvPr>
+        </p:nvSpPr>
+        <p:spPr/>
+        <p:txBody>
+          <a:bodyPr/>
+          <a:lstStyle/>
+          <a:p>
+            <a:pPr>
+              <a:defRPr/>
+            </a:pPr>
+            <a:fld id="{6E074355-CE0D-4C68-A6CB-C364ED71B33B}" type="slidenum">
+              <a:rPr lang="en-US" smtClean="0"/>
+              <a:pPr>
+                <a:defRPr/>
+              </a:pPr>
+              <a:t>3</a:t>
+            </a:fld>
+            <a:endParaRPr lang="en-US"/>
+          </a:p>
+        </p:txBody>
+      </p:sp>
+    </p:spTree>
+    <p:extLst>
+      <p:ext uri="{BB962C8B-B14F-4D97-AF65-F5344CB8AC3E}">
+        <p14:creationId xmlns:p14="http://schemas.microsoft.com/office/powerpoint/2010/main" val="585336991"/>
+      </p:ext>
+    </p:extLst>
+  </p:cSld>
+  <p:clrMapOvr>
+    <a:masterClrMapping/>
+  </p:clrMapOvr>
+</p:notes>
+</file>
+
+<file path=ppt/notesSlides/notesSlide2.xml><?xml version="1.0" encoding="utf-8"?>
+<p:notes xmlns:a="http://schemas.openxmlformats.org/drawingml/2006/main" xmlns:r="http://schemas.openxmlformats.org/officeDocument/2006/relationships" xmlns:p="http://schemas.openxmlformats.org/presentationml/2006/main">
+  <p:cSld>
+    <p:spTree>
+      <p:nvGrpSpPr>
+        <p:cNvPr id="1" name=""/>
+        <p:cNvGrpSpPr/>
+        <p:nvPr/>
+      </p:nvGrpSpPr>
+      <p:grpSpPr>
+        <a:xfrm>
+          <a:off x="0" y="0"/>
+          <a:ext cx="0" cy="0"/>
+          <a:chOff x="0" y="0"/>
+          <a:chExt cx="0" cy="0"/>
+        </a:xfrm>
+      </p:grpSpPr>
+      <p:sp>
+        <p:nvSpPr>
+          <p:cNvPr id="2" name="Slide Image Placeholder 1"/>
+          <p:cNvSpPr>
+            <a:spLocks noGrp="1" noRot="1" noChangeAspect="1"/>
+          </p:cNvSpPr>
+          <p:nvPr>
+            <p:ph type="sldImg"/>
+          </p:nvPr>
+        </p:nvSpPr>
+        <p:spPr/>
+      </p:sp>
+      <p:sp>
+        <p:nvSpPr>
+          <p:cNvPr id="3" name="Notes Placeholder 2"/>
+          <p:cNvSpPr>
+            <a:spLocks noGrp="1"/>
+          </p:cNvSpPr>
+          <p:nvPr>
+            <p:ph type="body" idx="1"/>
+          </p:nvPr>
+        </p:nvSpPr>
+        <p:spPr/>
+        <p:txBody>
+          <a:bodyPr/>
+          <a:lstStyle/>
+          <a:p>
+            <a:r>
+              <a:rPr lang="en-US" dirty="0" err="1" smtClean="0"/>
+              <a:t>Geosync</a:t>
+            </a:r>
+            <a:r>
+              <a:rPr lang="en-US" dirty="0" smtClean="0"/>
+              <a:t> – since</a:t>
+            </a:r>
+            <a:r>
+              <a:rPr lang="en-US" baseline="0" dirty="0" smtClean="0"/>
+              <a:t> 1990</a:t>
+            </a:r>
+            <a:r>
+              <a:rPr lang="en-US" dirty="0" smtClean="0"/>
+              <a:t>,</a:t>
+            </a:r>
+            <a:r>
+              <a:rPr lang="en-US" baseline="0" dirty="0" smtClean="0"/>
+              <a:t> not published how many SV tracked, entire signal is downlinked to process, included in </a:t>
+            </a:r>
+            <a:r>
+              <a:rPr lang="en-US" baseline="0" dirty="0" err="1" smtClean="0"/>
+              <a:t>nav</a:t>
+            </a:r>
+            <a:r>
+              <a:rPr lang="en-US" baseline="0" dirty="0" smtClean="0"/>
+              <a:t> model</a:t>
+            </a:r>
+          </a:p>
+          <a:p>
+            <a:r>
+              <a:rPr lang="en-US" baseline="0" dirty="0" smtClean="0"/>
+              <a:t>Ao40 – launched 2000, not very powerful tracking, max of 2 </a:t>
+            </a:r>
+            <a:r>
+              <a:rPr lang="en-US" baseline="0" dirty="0" err="1" smtClean="0"/>
+              <a:t>sats</a:t>
+            </a:r>
+            <a:r>
+              <a:rPr lang="en-US" baseline="0" dirty="0" smtClean="0"/>
+              <a:t> tracked</a:t>
+            </a:r>
+          </a:p>
+          <a:p>
+            <a:r>
+              <a:rPr lang="en-US" baseline="0" dirty="0" smtClean="0"/>
+              <a:t>GIOVE – launched 2005, Galileo test sat, onboard </a:t>
+            </a:r>
+            <a:r>
+              <a:rPr lang="en-US" baseline="0" dirty="0" err="1" smtClean="0"/>
+              <a:t>rx</a:t>
+            </a:r>
+            <a:r>
+              <a:rPr lang="en-US" baseline="0" dirty="0" smtClean="0"/>
+              <a:t> was able to produce </a:t>
+            </a:r>
+            <a:r>
+              <a:rPr lang="en-US" baseline="0" dirty="0" err="1" smtClean="0"/>
+              <a:t>nav</a:t>
+            </a:r>
+            <a:r>
+              <a:rPr lang="en-US" baseline="0" dirty="0" smtClean="0"/>
+              <a:t> sols with </a:t>
+            </a:r>
+            <a:r>
+              <a:rPr lang="en-US" baseline="0" dirty="0" err="1" smtClean="0"/>
+              <a:t>vdop</a:t>
+            </a:r>
+            <a:r>
+              <a:rPr lang="en-US" baseline="0" dirty="0" smtClean="0"/>
+              <a:t> 50-100m, </a:t>
+            </a:r>
+            <a:r>
+              <a:rPr lang="en-US" baseline="0" dirty="0" err="1" smtClean="0"/>
+              <a:t>hdop</a:t>
+            </a:r>
+            <a:r>
+              <a:rPr lang="en-US" baseline="0" dirty="0" smtClean="0"/>
+              <a:t> 10-15m (</a:t>
+            </a:r>
+          </a:p>
+          <a:p>
+            <a:r>
+              <a:rPr lang="en-US" baseline="0" dirty="0" smtClean="0"/>
+              <a:t>MMS –  launched 2015, has Navigator receiver - tracked at least 4 </a:t>
+            </a:r>
+            <a:r>
+              <a:rPr lang="en-US" baseline="0" dirty="0" err="1" smtClean="0"/>
+              <a:t>sats</a:t>
+            </a:r>
+            <a:r>
+              <a:rPr lang="en-US" baseline="0" dirty="0" smtClean="0"/>
+              <a:t> all the time</a:t>
+            </a:r>
+          </a:p>
+          <a:p>
+            <a:endParaRPr lang="en-US" baseline="0" dirty="0" smtClean="0"/>
+          </a:p>
+          <a:p>
+            <a:r>
+              <a:rPr lang="en-US" baseline="0" dirty="0" smtClean="0"/>
+              <a:t>Cite: </a:t>
+            </a:r>
+            <a:r>
+              <a:rPr lang="en-US" baseline="0" dirty="0" err="1" smtClean="0"/>
+              <a:t>ssv</a:t>
+            </a:r>
+            <a:r>
+              <a:rPr lang="en-US" baseline="0" dirty="0" smtClean="0"/>
+              <a:t>, gps2000 [</a:t>
+            </a:r>
+            <a:r>
+              <a:rPr lang="en-US" baseline="0" dirty="0" err="1" smtClean="0"/>
+              <a:t>kronman</a:t>
+            </a:r>
+            <a:r>
+              <a:rPr lang="en-US" baseline="0" dirty="0" smtClean="0"/>
+              <a:t>], ao40, </a:t>
+            </a:r>
+            <a:r>
+              <a:rPr lang="en-US" baseline="0" dirty="0" err="1" smtClean="0"/>
+              <a:t>gps</a:t>
+            </a:r>
+            <a:r>
+              <a:rPr lang="en-US" baseline="0" dirty="0" smtClean="0"/>
+              <a:t> receiver </a:t>
+            </a:r>
+            <a:r>
+              <a:rPr lang="en-US" baseline="0" dirty="0" err="1" smtClean="0"/>
+              <a:t>dem</a:t>
+            </a:r>
+            <a:r>
+              <a:rPr lang="en-US" baseline="0" dirty="0" smtClean="0"/>
+              <a:t> 2007	</a:t>
+            </a:r>
+          </a:p>
+          <a:p>
+            <a:endParaRPr lang="en-US" dirty="0"/>
+          </a:p>
+        </p:txBody>
+      </p:sp>
+      <p:sp>
+        <p:nvSpPr>
+          <p:cNvPr id="4" name="Slide Number Placeholder 3"/>
+          <p:cNvSpPr>
+            <a:spLocks noGrp="1"/>
+          </p:cNvSpPr>
+          <p:nvPr>
+            <p:ph type="sldNum" sz="quarter" idx="10"/>
+          </p:nvPr>
+        </p:nvSpPr>
+        <p:spPr/>
+        <p:txBody>
+          <a:bodyPr/>
+          <a:lstStyle/>
+          <a:p>
+            <a:pPr>
+              <a:defRPr/>
+            </a:pPr>
+            <a:fld id="{6E074355-CE0D-4C68-A6CB-C364ED71B33B}" type="slidenum">
+              <a:rPr lang="en-US" smtClean="0"/>
+              <a:pPr>
+                <a:defRPr/>
+              </a:pPr>
+              <a:t>4</a:t>
+            </a:fld>
+            <a:endParaRPr lang="en-US"/>
+          </a:p>
+        </p:txBody>
+      </p:sp>
+    </p:spTree>
+    <p:extLst>
+      <p:ext uri="{BB962C8B-B14F-4D97-AF65-F5344CB8AC3E}">
+        <p14:creationId xmlns:p14="http://schemas.microsoft.com/office/powerpoint/2010/main" val="2196772181"/>
+      </p:ext>
+    </p:extLst>
+  </p:cSld>
+  <p:clrMapOvr>
+    <a:masterClrMapping/>
+  </p:clrMapOvr>
+</p:notes>
+</file>
+
+<file path=ppt/notesSlides/notesSlide3.xml><?xml version="1.0" encoding="utf-8"?>
+<p:notes xmlns:a="http://schemas.openxmlformats.org/drawingml/2006/main" xmlns:r="http://schemas.openxmlformats.org/officeDocument/2006/relationships" xmlns:p="http://schemas.openxmlformats.org/presentationml/2006/main">
+  <p:cSld>
+    <p:spTree>
+      <p:nvGrpSpPr>
+        <p:cNvPr id="1" name=""/>
+        <p:cNvGrpSpPr/>
+        <p:nvPr/>
+      </p:nvGrpSpPr>
+      <p:grpSpPr>
+        <a:xfrm>
+          <a:off x="0" y="0"/>
+          <a:ext cx="0" cy="0"/>
+          <a:chOff x="0" y="0"/>
+          <a:chExt cx="0" cy="0"/>
+        </a:xfrm>
+      </p:grpSpPr>
+      <p:sp>
+        <p:nvSpPr>
+          <p:cNvPr id="2" name="Slide Image Placeholder 1"/>
+          <p:cNvSpPr>
+            <a:spLocks noGrp="1" noRot="1" noChangeAspect="1"/>
+          </p:cNvSpPr>
+          <p:nvPr>
+            <p:ph type="sldImg"/>
+          </p:nvPr>
+        </p:nvSpPr>
+        <p:spPr/>
+      </p:sp>
+      <p:sp>
+        <p:nvSpPr>
+          <p:cNvPr id="3" name="Notes Placeholder 2"/>
+          <p:cNvSpPr>
+            <a:spLocks noGrp="1"/>
+          </p:cNvSpPr>
+          <p:nvPr>
+            <p:ph type="body" idx="1"/>
+          </p:nvPr>
+        </p:nvSpPr>
+        <p:spPr/>
+        <p:txBody>
+          <a:bodyPr/>
+          <a:lstStyle/>
+          <a:p>
+            <a:r>
+              <a:rPr lang="en-US" dirty="0" smtClean="0"/>
+              <a:t>Given</a:t>
+            </a:r>
+            <a:r>
+              <a:rPr lang="en-US" baseline="0" dirty="0" smtClean="0"/>
+              <a:t> in terms of </a:t>
+            </a:r>
+            <a:r>
+              <a:rPr lang="en-US" baseline="0" dirty="0" err="1" smtClean="0"/>
+              <a:t>offbore</a:t>
+            </a:r>
+            <a:r>
+              <a:rPr lang="en-US" baseline="0" dirty="0" smtClean="0"/>
+              <a:t> sight theta, and clock angle phi</a:t>
+            </a:r>
+          </a:p>
+          <a:p>
+            <a:r>
+              <a:rPr lang="en-US" baseline="0" dirty="0" smtClean="0"/>
+              <a:t>Cite GPS Block… Marquis</a:t>
+            </a:r>
+          </a:p>
+          <a:p>
+            <a:r>
+              <a:rPr lang="en-US" baseline="0" dirty="0" smtClean="0"/>
+              <a:t>Cite </a:t>
+            </a:r>
+            <a:r>
+              <a:rPr lang="en-US" baseline="0" dirty="0" err="1" smtClean="0"/>
+              <a:t>montenbruck</a:t>
+            </a:r>
+            <a:endParaRPr lang="en-US" dirty="0"/>
+          </a:p>
+        </p:txBody>
+      </p:sp>
+      <p:sp>
+        <p:nvSpPr>
+          <p:cNvPr id="4" name="Slide Number Placeholder 3"/>
+          <p:cNvSpPr>
+            <a:spLocks noGrp="1"/>
+          </p:cNvSpPr>
+          <p:nvPr>
+            <p:ph type="sldNum" sz="quarter" idx="10"/>
+          </p:nvPr>
+        </p:nvSpPr>
+        <p:spPr/>
+        <p:txBody>
+          <a:bodyPr/>
+          <a:lstStyle/>
+          <a:p>
+            <a:pPr>
+              <a:defRPr/>
+            </a:pPr>
+            <a:fld id="{6E074355-CE0D-4C68-A6CB-C364ED71B33B}" type="slidenum">
+              <a:rPr lang="en-US" smtClean="0"/>
+              <a:pPr>
+                <a:defRPr/>
+              </a:pPr>
+              <a:t>8</a:t>
+            </a:fld>
+            <a:endParaRPr lang="en-US"/>
+          </a:p>
+        </p:txBody>
+      </p:sp>
+    </p:spTree>
+    <p:extLst>
+      <p:ext uri="{BB962C8B-B14F-4D97-AF65-F5344CB8AC3E}">
+        <p14:creationId xmlns:p14="http://schemas.microsoft.com/office/powerpoint/2010/main" val="3253973478"/>
+      </p:ext>
+    </p:extLst>
+  </p:cSld>
+  <p:clrMapOvr>
+    <a:masterClrMapping/>
+  </p:clrMapOvr>
+</p:notes>
 </file>
 
 <file path=ppt/slideLayouts/slideLayout1.xml><?xml version="1.0" encoding="utf-8"?>
@@ -3769,9 +4216,58 @@
           <a:p>
             <a:r>
               <a:rPr lang="en-US" dirty="0" smtClean="0"/>
-              <a:t>Matthew Cullen Self</a:t>
-            </a:r>
-            <a:endParaRPr lang="en-US" dirty="0"/>
+              <a:t>Matthew Cullen </a:t>
+            </a:r>
+            <a:r>
+              <a:rPr lang="en-US" cap="small" dirty="0" smtClean="0"/>
+              <a:t>Self</a:t>
+            </a:r>
+          </a:p>
+          <a:p>
+            <a:r>
+              <a:rPr lang="en-US" sz="2400" dirty="0" smtClean="0"/>
+              <a:t>December 9, 2016</a:t>
+            </a:r>
+          </a:p>
+        </p:txBody>
+      </p:sp>
+      <p:sp>
+        <p:nvSpPr>
+          <p:cNvPr id="2" name="Rectangle 1"/>
+          <p:cNvSpPr/>
+          <p:nvPr/>
+        </p:nvSpPr>
+        <p:spPr>
+          <a:xfrm>
+            <a:off x="3670951" y="1899592"/>
+            <a:ext cx="1595310" cy="523220"/>
+          </a:xfrm>
+          <a:prstGeom prst="rect">
+            <a:avLst/>
+          </a:prstGeom>
+        </p:spPr>
+        <p:txBody>
+          <a:bodyPr wrap="none">
+            <a:spAutoFit/>
+          </a:bodyPr>
+          <a:lstStyle/>
+          <a:p>
+            <a:pPr algn="r"/>
+            <a:r>
+              <a:rPr lang="en-US" sz="2800" dirty="0">
+                <a:solidFill>
+                  <a:srgbClr val="898989"/>
+                </a:solidFill>
+                <a:latin typeface="+mn-lt"/>
+              </a:rPr>
+              <a:t>ASE 372N</a:t>
+            </a:r>
+            <a:endParaRPr lang="en-US" sz="2800" dirty="0">
+              <a:solidFill>
+                <a:srgbClr val="898989"/>
+              </a:solidFill>
+              <a:latin typeface="+mn-lt"/>
+            </a:endParaRPr>
           </a:p>
         </p:txBody>
       </p:sp>
@@ -3785,6 +4281,13 @@
   <p:clrMapOvr>
     <a:masterClrMapping/>
   </p:clrMapOvr>
+  <p:timing>
+    <p:tnLst>
+      <p:par>
+        <p:cTn id="1" dur="indefinite" restart="never" nodeType="tmRoot"/>
+      </p:par>
+    </p:tnLst>
+  </p:timing>
 </p:sld>
 </file>
 
@@ -3843,7 +4346,7 @@
           <a:bodyPr/>
           <a:lstStyle/>
           <a:p>
-            <a:endParaRPr lang="en-US"/>
+            <a:endParaRPr lang="en-US" dirty="0"/>
           </a:p>
         </p:txBody>
       </p:sp>
@@ -4685,6 +5188,10 @@
           <a:bodyPr/>
           <a:lstStyle/>
           <a:p>
+            <a:r>
+              <a:rPr lang="en-US" dirty="0" smtClean="0"/>
+              <a:t>Will my GPS receiver work on the moon?</a:t>
+            </a:r>
             <a:endParaRPr lang="en-US" dirty="0"/>
           </a:p>
         </p:txBody>
@@ -4699,6 +5206,13 @@
   <p:clrMapOvr>
     <a:masterClrMapping/>
   </p:clrMapOvr>
+  <p:timing>
+    <p:tnLst>
+      <p:par>
+        <p:cTn id="1" dur="indefinite" restart="never" nodeType="tmRoot"/>
+      </p:par>
+    </p:tnLst>
+  </p:timing>
 </p:sld>
 </file>
 
@@ -4736,7 +5250,7 @@
           <a:p>
             <a:r>
               <a:rPr lang="en-US" dirty="0" smtClean="0"/>
-              <a:t>How GPS SVs Broadcast</a:t>
+              <a:t>How GNSS SVs Broadcast</a:t>
             </a:r>
             <a:endParaRPr lang="en-US" dirty="0"/>
           </a:p>
@@ -4757,7 +5271,31 @@
           <a:bodyPr/>
           <a:lstStyle/>
           <a:p>
-            <a:endParaRPr lang="en-US"/>
+            <a:r>
+              <a:rPr lang="en-US" dirty="0" smtClean="0"/>
+              <a:t>Antenna pointed at Earth</a:t>
+            </a:r>
+          </a:p>
+          <a:p>
+            <a:r>
+              <a:rPr lang="en-US" dirty="0" smtClean="0"/>
+              <a:t>Emit a Hemisphere of Radio Waves</a:t>
+            </a:r>
+          </a:p>
+          <a:p>
+            <a:pPr lvl="1"/>
+            <a:r>
+              <a:rPr lang="en-US" dirty="0" smtClean="0"/>
+              <a:t>Most power in “Main Lobe”</a:t>
+            </a:r>
+          </a:p>
+          <a:p>
+            <a:pPr lvl="1"/>
+            <a:r>
+              <a:rPr lang="en-US" dirty="0" smtClean="0"/>
+              <a:t>“Side Lobes” still have some power</a:t>
+            </a:r>
+            <a:endParaRPr lang="en-US" dirty="0"/>
           </a:p>
         </p:txBody>
       </p:sp>
@@ -4771,6 +5309,13 @@
   <p:clrMapOvr>
     <a:masterClrMapping/>
   </p:clrMapOvr>
+  <p:timing>
+    <p:tnLst>
+      <p:par>
+        <p:cTn id="1" dur="indefinite" restart="never" nodeType="tmRoot"/>
+      </p:par>
+    </p:tnLst>
+  </p:timing>
 </p:sld>
 </file>
 
@@ -4829,7 +5374,32 @@
           <a:bodyPr/>
           <a:lstStyle/>
           <a:p>
-            <a:endParaRPr lang="en-US"/>
+            <a:r>
+              <a:rPr lang="en-US" dirty="0"/>
+              <a:t>Classified Geosynchronous Satellite </a:t>
+            </a:r>
+            <a:r>
+              <a:rPr lang="en-US" dirty="0" smtClean="0"/>
+              <a:t>(42,164 km)</a:t>
+            </a:r>
+          </a:p>
+          <a:p>
+            <a:r>
+              <a:rPr lang="en-US" dirty="0" smtClean="0"/>
+              <a:t>AMSAT-Oscar-40 (58,800 km)</a:t>
+            </a:r>
+          </a:p>
+          <a:p>
+            <a:r>
+              <a:rPr lang="en-US" dirty="0" smtClean="0"/>
+              <a:t>GIOVE-A SGR-GEO (23,200 km)</a:t>
+            </a:r>
+          </a:p>
+          <a:p>
+            <a:r>
+              <a:rPr lang="en-US" dirty="0" smtClean="0"/>
+              <a:t>MMS (76,000 km)</a:t>
+            </a:r>
           </a:p>
         </p:txBody>
       </p:sp>
@@ -4843,6 +5413,13 @@
   <p:clrMapOvr>
     <a:masterClrMapping/>
   </p:clrMapOvr>
+  <p:timing>
+    <p:tnLst>
+      <p:par>
+        <p:cTn id="1" dur="indefinite" restart="never" nodeType="tmRoot"/>
+      </p:par>
+    </p:tnLst>
+  </p:timing>
 </p:sld>
 </file>
 
@@ -4901,7 +5478,11 @@
           <a:bodyPr/>
           <a:lstStyle/>
           <a:p>
-            <a:endParaRPr lang="en-US"/>
+            <a:r>
+              <a:rPr lang="en-US" dirty="0" smtClean="0"/>
+              <a:t>Can I test without going to the moon?</a:t>
+            </a:r>
+            <a:endParaRPr lang="en-US" dirty="0"/>
           </a:p>
         </p:txBody>
       </p:sp>
@@ -4915,6 +5496,13 @@
   <p:clrMapOvr>
     <a:masterClrMapping/>
   </p:clrMapOvr>
+  <p:timing>
+    <p:tnLst>
+      <p:par>
+        <p:cTn id="1" dur="indefinite" restart="never" nodeType="tmRoot"/>
+      </p:par>
+    </p:tnLst>
+  </p:timing>
 </p:sld>
 </file>
 
@@ -4952,7 +5540,7 @@
           <a:p>
             <a:r>
               <a:rPr lang="en-US" dirty="0" smtClean="0"/>
-              <a:t>Considerations</a:t>
+              <a:t>Quality of the Receiver</a:t>
             </a:r>
             <a:endParaRPr lang="en-US" dirty="0"/>
           </a:p>
@@ -4973,7 +5561,28 @@
           <a:bodyPr/>
           <a:lstStyle/>
           <a:p>
-            <a:endParaRPr lang="en-US"/>
+            <a:r>
+              <a:rPr lang="en-US" dirty="0" smtClean="0"/>
+              <a:t>Antenna</a:t>
+            </a:r>
+          </a:p>
+          <a:p>
+            <a:r>
+              <a:rPr lang="en-US" dirty="0" smtClean="0"/>
+              <a:t>Noise</a:t>
+            </a:r>
+          </a:p>
+          <a:p>
+            <a:r>
+              <a:rPr lang="en-US" dirty="0" smtClean="0"/>
+              <a:t>Gain</a:t>
+            </a:r>
+          </a:p>
+          <a:p>
+            <a:r>
+              <a:rPr lang="en-US" dirty="0" smtClean="0"/>
+              <a:t>Tracking Algorithm</a:t>
+            </a:r>
           </a:p>
         </p:txBody>
       </p:sp>
@@ -4987,6 +5596,13 @@
   <p:clrMapOvr>
     <a:masterClrMapping/>
   </p:clrMapOvr>
+  <p:timing>
+    <p:tnLst>
+      <p:par>
+        <p:cTn id="1" dur="indefinite" restart="never" nodeType="tmRoot"/>
+      </p:par>
+    </p:tnLst>
+  </p:timing>
 </p:sld>
 </file>
 
@@ -5030,25 +5646,66 @@
           </a:p>
         </p:txBody>
       </p:sp>
-      <p:sp>
-        <p:nvSpPr>
-          <p:cNvPr id="3" name="Content Placeholder 2"/>
-          <p:cNvSpPr>
-            <a:spLocks noGrp="1"/>
-          </p:cNvSpPr>
-          <p:nvPr>
-            <p:ph idx="1"/>
-          </p:nvPr>
-        </p:nvSpPr>
-        <p:spPr/>
-        <p:txBody>
-          <a:bodyPr/>
-          <a:lstStyle/>
-          <a:p>
-            <a:endParaRPr lang="en-US"/>
-          </a:p>
-        </p:txBody>
-      </p:sp>
+      <p:pic>
+        <p:nvPicPr>
+          <p:cNvPr id="5" name="Picture 4"/>
+          <p:cNvPicPr>
+            <a:picLocks noChangeAspect="1"/>
+          </p:cNvPicPr>
+          <p:nvPr/>
+        </p:nvPicPr>
+        <p:blipFill>
+          <a:blip r:embed="rId2">
+            <a:extLst>
+              <a:ext uri="{28A0092B-C50C-407E-A947-70E740481C1C}">
+                <a14:useLocalDpi xmlns:a14="http://schemas.microsoft.com/office/drawing/2010/main" val="0"/>
+              </a:ext>
+            </a:extLst>
+          </a:blip>
+          <a:stretch>
+            <a:fillRect/>
+          </a:stretch>
+        </p:blipFill>
+        <p:spPr>
+          <a:xfrm>
+            <a:off x="2005007" y="2694781"/>
+            <a:ext cx="5133975" cy="523875"/>
+          </a:xfrm>
+          <a:prstGeom prst="rect">
+            <a:avLst/>
+          </a:prstGeom>
+        </p:spPr>
+      </p:pic>
+      <p:pic>
+        <p:nvPicPr>
+          <p:cNvPr id="6" name="Picture 5"/>
+          <p:cNvPicPr>
+            <a:picLocks noChangeAspect="1"/>
+          </p:cNvPicPr>
+          <p:nvPr/>
+        </p:nvPicPr>
+        <p:blipFill>
+          <a:blip r:embed="rId3">
+            <a:extLst>
+              <a:ext uri="{28A0092B-C50C-407E-A947-70E740481C1C}">
+                <a14:useLocalDpi xmlns:a14="http://schemas.microsoft.com/office/drawing/2010/main" val="0"/>
+              </a:ext>
+            </a:extLst>
+          </a:blip>
+          <a:stretch>
+            <a:fillRect/>
+          </a:stretch>
+        </p:blipFill>
+        <p:spPr>
+          <a:xfrm>
+            <a:off x="1357308" y="3733800"/>
+            <a:ext cx="6429375" cy="685800"/>
+          </a:xfrm>
+          <a:prstGeom prst="rect">
+            <a:avLst/>
+          </a:prstGeom>
+        </p:spPr>
+      </p:pic>
     </p:spTree>
     <p:extLst>
       <p:ext uri="{BB962C8B-B14F-4D97-AF65-F5344CB8AC3E}">
@@ -5059,6 +5716,13 @@
   <p:clrMapOvr>
     <a:masterClrMapping/>
   </p:clrMapOvr>
+  <p:timing>
+    <p:tnLst>
+      <p:par>
+        <p:cTn id="1" dur="indefinite" restart="never" nodeType="tmRoot"/>
+      </p:par>
+    </p:tnLst>
+  </p:timing>
 </p:sld>
 </file>
 
@@ -5117,7 +5781,25 @@
           <a:bodyPr/>
           <a:lstStyle/>
           <a:p>
-            <a:endParaRPr lang="en-US"/>
+            <a:r>
+              <a:rPr lang="en-US" dirty="0" smtClean="0"/>
+              <a:t>Gain patterns of GPS Block IIR &amp; IIR(M) SVs (Lockheed Martin)</a:t>
+            </a:r>
+          </a:p>
+          <a:p>
+            <a:r>
+              <a:rPr lang="en-US" dirty="0" smtClean="0"/>
+              <a:t>GNSS Attitude Models (</a:t>
+            </a:r>
+            <a:r>
+              <a:rPr lang="en-US" dirty="0" err="1" smtClean="0"/>
+              <a:t>Montenbruck</a:t>
+            </a:r>
+            <a:r>
+              <a:rPr lang="en-US" dirty="0" smtClean="0"/>
+              <a:t>)</a:t>
+            </a:r>
+            <a:endParaRPr lang="en-US" dirty="0"/>
           </a:p>
         </p:txBody>
       </p:sp>
@@ -5131,6 +5813,13 @@
   <p:clrMapOvr>
     <a:masterClrMapping/>
   </p:clrMapOvr>
+  <p:timing>
+    <p:tnLst>
+      <p:par>
+        <p:cTn id="1" dur="indefinite" restart="never" nodeType="tmRoot"/>
+      </p:par>
+    </p:tnLst>
+  </p:timing>
 </p:sld>
 </file>
 
@@ -5189,7 +5878,31 @@
           <a:bodyPr/>
           <a:lstStyle/>
           <a:p>
-            <a:endParaRPr lang="en-US"/>
+            <a:r>
+              <a:rPr lang="en-US" dirty="0" smtClean="0"/>
+              <a:t>All SVs are similar</a:t>
+            </a:r>
+          </a:p>
+          <a:p>
+            <a:r>
+              <a:rPr lang="en-US" dirty="0" smtClean="0"/>
+              <a:t>SVs nominally emit 30 </a:t>
+            </a:r>
+            <a:r>
+              <a:rPr lang="en-US" dirty="0" err="1" smtClean="0"/>
+              <a:t>dBW</a:t>
+            </a:r>
+            <a:r>
+              <a:rPr lang="en-US" dirty="0" smtClean="0"/>
+              <a:t> of power</a:t>
+            </a:r>
+          </a:p>
+          <a:p>
+            <a:r>
+              <a:rPr lang="en-US" dirty="0" smtClean="0"/>
+              <a:t>Receiver has uniform gain </a:t>
+            </a:r>
+            <a:endParaRPr lang="en-US" dirty="0"/>
           </a:p>
         </p:txBody>
       </p:sp>
@@ -5203,6 +5916,13 @@
   <p:clrMapOvr>
     <a:masterClrMapping/>
   </p:clrMapOvr>
+  <p:timing>
+    <p:tnLst>
+      <p:par>
+        <p:cTn id="1" dur="indefinite" restart="never" nodeType="tmRoot"/>
+      </p:par>
+    </p:tnLst>
+  </p:timing>
 </p:sld>
 </file>
 

</xml_diff>

<commit_message>
Reorganized data scripts, setup single sat test
</commit_message>
<xml_diff>
--- a/Report/Extended GNSS.pptx
+++ b/Report/Extended GNSS.pptx
@@ -5263,7 +5263,7 @@
             <a:spLocks noGrp="1"/>
           </p:cNvSpPr>
           <p:nvPr>
-            <p:ph idx="1"/>
+            <p:ph sz="half" idx="1"/>
           </p:nvPr>
         </p:nvSpPr>
         <p:spPr/>
@@ -5299,6 +5299,36 @@
           </a:p>
         </p:txBody>
       </p:sp>
+      <p:pic>
+        <p:nvPicPr>
+          <p:cNvPr id="6" name="Picture 5"/>
+          <p:cNvPicPr>
+            <a:picLocks noChangeAspect="1"/>
+          </p:cNvPicPr>
+          <p:nvPr/>
+        </p:nvPicPr>
+        <p:blipFill>
+          <a:blip r:embed="rId3">
+            <a:extLst>
+              <a:ext uri="{28A0092B-C50C-407E-A947-70E740481C1C}">
+                <a14:useLocalDpi xmlns:a14="http://schemas.microsoft.com/office/drawing/2010/main" val="0"/>
+              </a:ext>
+            </a:extLst>
+          </a:blip>
+          <a:stretch>
+            <a:fillRect/>
+          </a:stretch>
+        </p:blipFill>
+        <p:spPr>
+          <a:xfrm>
+            <a:off x="4535424" y="2209800"/>
+            <a:ext cx="4078520" cy="3635947"/>
+          </a:xfrm>
+          <a:prstGeom prst="rect">
+            <a:avLst/>
+          </a:prstGeom>
+        </p:spPr>
+      </p:pic>
     </p:spTree>
     <p:extLst>
       <p:ext uri="{BB962C8B-B14F-4D97-AF65-F5344CB8AC3E}">

</xml_diff>

<commit_message>
Updated Powerpoint, start of formal report
</commit_message>
<xml_diff>
--- a/Report/Extended GNSS.pptx
+++ b/Report/Extended GNSS.pptx
@@ -6,7 +6,7 @@
     <p:sldMasterId id="2147483669" r:id="rId2"/>
   </p:sldMasterIdLst>
   <p:notesMasterIdLst>
-    <p:notesMasterId r:id="rId21"/>
+    <p:notesMasterId r:id="rId27"/>
   </p:notesMasterIdLst>
   <p:sldIdLst>
     <p:sldId id="709" r:id="rId3"/>
@@ -20,13 +20,19 @@
     <p:sldId id="721" r:id="rId11"/>
     <p:sldId id="717" r:id="rId12"/>
     <p:sldId id="722" r:id="rId13"/>
-    <p:sldId id="718" r:id="rId14"/>
-    <p:sldId id="719" r:id="rId15"/>
-    <p:sldId id="720" r:id="rId16"/>
-    <p:sldId id="723" r:id="rId17"/>
-    <p:sldId id="724" r:id="rId18"/>
-    <p:sldId id="725" r:id="rId19"/>
-    <p:sldId id="726" r:id="rId20"/>
+    <p:sldId id="727" r:id="rId14"/>
+    <p:sldId id="728" r:id="rId15"/>
+    <p:sldId id="729" r:id="rId16"/>
+    <p:sldId id="718" r:id="rId17"/>
+    <p:sldId id="719" r:id="rId18"/>
+    <p:sldId id="720" r:id="rId19"/>
+    <p:sldId id="730" r:id="rId20"/>
+    <p:sldId id="731" r:id="rId21"/>
+    <p:sldId id="723" r:id="rId22"/>
+    <p:sldId id="724" r:id="rId23"/>
+    <p:sldId id="725" r:id="rId24"/>
+    <p:sldId id="726" r:id="rId25"/>
+    <p:sldId id="732" r:id="rId26"/>
   </p:sldIdLst>
   <p:sldSz cx="9144000" cy="6858000" type="screen4x3"/>
   <p:notesSz cx="6858000" cy="9313863"/>
@@ -183,9 +189,14 @@
           <p14:sldIdLst>
             <p14:sldId id="717"/>
             <p14:sldId id="722"/>
+            <p14:sldId id="727"/>
+            <p14:sldId id="728"/>
+            <p14:sldId id="729"/>
             <p14:sldId id="718"/>
             <p14:sldId id="719"/>
             <p14:sldId id="720"/>
+            <p14:sldId id="730"/>
+            <p14:sldId id="731"/>
           </p14:sldIdLst>
         </p14:section>
         <p14:section name="Conclusions" id="{4067D62D-5428-4C25-AB87-0AF64B6C9B19}">
@@ -194,6 +205,7 @@
             <p14:sldId id="724"/>
             <p14:sldId id="725"/>
             <p14:sldId id="726"/>
+            <p14:sldId id="732"/>
           </p14:sldIdLst>
         </p14:section>
       </p14:sectionLst>
@@ -778,6 +790,186 @@
 </p:notes>
 </file>
 
+<file path=ppt/notesSlides/notesSlide10.xml><?xml version="1.0" encoding="utf-8"?>
+<p:notes xmlns:a="http://schemas.openxmlformats.org/drawingml/2006/main" xmlns:r="http://schemas.openxmlformats.org/officeDocument/2006/relationships" xmlns:p="http://schemas.openxmlformats.org/presentationml/2006/main">
+  <p:cSld>
+    <p:spTree>
+      <p:nvGrpSpPr>
+        <p:cNvPr id="1" name=""/>
+        <p:cNvGrpSpPr/>
+        <p:nvPr/>
+      </p:nvGrpSpPr>
+      <p:grpSpPr>
+        <a:xfrm>
+          <a:off x="0" y="0"/>
+          <a:ext cx="0" cy="0"/>
+          <a:chOff x="0" y="0"/>
+          <a:chExt cx="0" cy="0"/>
+        </a:xfrm>
+      </p:grpSpPr>
+      <p:sp>
+        <p:nvSpPr>
+          <p:cNvPr id="2" name="Slide Image Placeholder 1"/>
+          <p:cNvSpPr>
+            <a:spLocks noGrp="1" noRot="1" noChangeAspect="1"/>
+          </p:cNvSpPr>
+          <p:nvPr>
+            <p:ph type="sldImg"/>
+          </p:nvPr>
+        </p:nvSpPr>
+        <p:spPr/>
+      </p:sp>
+      <p:sp>
+        <p:nvSpPr>
+          <p:cNvPr id="3" name="Notes Placeholder 2"/>
+          <p:cNvSpPr>
+            <a:spLocks noGrp="1"/>
+          </p:cNvSpPr>
+          <p:nvPr>
+            <p:ph type="body" idx="1"/>
+          </p:nvPr>
+        </p:nvSpPr>
+        <p:spPr/>
+        <p:txBody>
+          <a:bodyPr/>
+          <a:lstStyle/>
+          <a:p>
+            <a:endParaRPr lang="en-US" dirty="0"/>
+          </a:p>
+        </p:txBody>
+      </p:sp>
+      <p:sp>
+        <p:nvSpPr>
+          <p:cNvPr id="4" name="Slide Number Placeholder 3"/>
+          <p:cNvSpPr>
+            <a:spLocks noGrp="1"/>
+          </p:cNvSpPr>
+          <p:nvPr>
+            <p:ph type="sldNum" sz="quarter" idx="10"/>
+          </p:nvPr>
+        </p:nvSpPr>
+        <p:spPr/>
+        <p:txBody>
+          <a:bodyPr/>
+          <a:lstStyle/>
+          <a:p>
+            <a:pPr>
+              <a:defRPr/>
+            </a:pPr>
+            <a:fld id="{6E074355-CE0D-4C68-A6CB-C364ED71B33B}" type="slidenum">
+              <a:rPr lang="en-US" smtClean="0"/>
+              <a:pPr>
+                <a:defRPr/>
+              </a:pPr>
+              <a:t>19</a:t>
+            </a:fld>
+            <a:endParaRPr lang="en-US"/>
+          </a:p>
+        </p:txBody>
+      </p:sp>
+    </p:spTree>
+    <p:extLst>
+      <p:ext uri="{BB962C8B-B14F-4D97-AF65-F5344CB8AC3E}">
+        <p14:creationId xmlns:p14="http://schemas.microsoft.com/office/powerpoint/2010/main" val="2893231731"/>
+      </p:ext>
+    </p:extLst>
+  </p:cSld>
+  <p:clrMapOvr>
+    <a:masterClrMapping/>
+  </p:clrMapOvr>
+</p:notes>
+</file>
+
+<file path=ppt/notesSlides/notesSlide11.xml><?xml version="1.0" encoding="utf-8"?>
+<p:notes xmlns:a="http://schemas.openxmlformats.org/drawingml/2006/main" xmlns:r="http://schemas.openxmlformats.org/officeDocument/2006/relationships" xmlns:p="http://schemas.openxmlformats.org/presentationml/2006/main">
+  <p:cSld>
+    <p:spTree>
+      <p:nvGrpSpPr>
+        <p:cNvPr id="1" name=""/>
+        <p:cNvGrpSpPr/>
+        <p:nvPr/>
+      </p:nvGrpSpPr>
+      <p:grpSpPr>
+        <a:xfrm>
+          <a:off x="0" y="0"/>
+          <a:ext cx="0" cy="0"/>
+          <a:chOff x="0" y="0"/>
+          <a:chExt cx="0" cy="0"/>
+        </a:xfrm>
+      </p:grpSpPr>
+      <p:sp>
+        <p:nvSpPr>
+          <p:cNvPr id="2" name="Slide Image Placeholder 1"/>
+          <p:cNvSpPr>
+            <a:spLocks noGrp="1" noRot="1" noChangeAspect="1"/>
+          </p:cNvSpPr>
+          <p:nvPr>
+            <p:ph type="sldImg"/>
+          </p:nvPr>
+        </p:nvSpPr>
+        <p:spPr/>
+      </p:sp>
+      <p:sp>
+        <p:nvSpPr>
+          <p:cNvPr id="3" name="Notes Placeholder 2"/>
+          <p:cNvSpPr>
+            <a:spLocks noGrp="1"/>
+          </p:cNvSpPr>
+          <p:nvPr>
+            <p:ph type="body" idx="1"/>
+          </p:nvPr>
+        </p:nvSpPr>
+        <p:spPr/>
+        <p:txBody>
+          <a:bodyPr/>
+          <a:lstStyle/>
+          <a:p>
+            <a:endParaRPr lang="en-US" dirty="0"/>
+          </a:p>
+        </p:txBody>
+      </p:sp>
+      <p:sp>
+        <p:nvSpPr>
+          <p:cNvPr id="4" name="Slide Number Placeholder 3"/>
+          <p:cNvSpPr>
+            <a:spLocks noGrp="1"/>
+          </p:cNvSpPr>
+          <p:nvPr>
+            <p:ph type="sldNum" sz="quarter" idx="10"/>
+          </p:nvPr>
+        </p:nvSpPr>
+        <p:spPr/>
+        <p:txBody>
+          <a:bodyPr/>
+          <a:lstStyle/>
+          <a:p>
+            <a:pPr>
+              <a:defRPr/>
+            </a:pPr>
+            <a:fld id="{6E074355-CE0D-4C68-A6CB-C364ED71B33B}" type="slidenum">
+              <a:rPr lang="en-US" smtClean="0"/>
+              <a:pPr>
+                <a:defRPr/>
+              </a:pPr>
+              <a:t>21</a:t>
+            </a:fld>
+            <a:endParaRPr lang="en-US"/>
+          </a:p>
+        </p:txBody>
+      </p:sp>
+    </p:spTree>
+    <p:extLst>
+      <p:ext uri="{BB962C8B-B14F-4D97-AF65-F5344CB8AC3E}">
+        <p14:creationId xmlns:p14="http://schemas.microsoft.com/office/powerpoint/2010/main" val="3687895229"/>
+      </p:ext>
+    </p:extLst>
+  </p:cSld>
+  <p:clrMapOvr>
+    <a:masterClrMapping/>
+  </p:clrMapOvr>
+</p:notes>
+</file>
+
 <file path=ppt/notesSlides/notesSlide2.xml><?xml version="1.0" encoding="utf-8"?>
 <p:notes xmlns:a="http://schemas.openxmlformats.org/drawingml/2006/main" xmlns:r="http://schemas.openxmlformats.org/officeDocument/2006/relationships" xmlns:p="http://schemas.openxmlformats.org/presentationml/2006/main">
   <p:cSld>
@@ -1051,6 +1243,104 @@
           <a:p>
             <a:r>
               <a:rPr lang="en-US" dirty="0" smtClean="0"/>
+              <a:t>Intro</a:t>
+            </a:r>
+            <a:r>
+              <a:rPr lang="en-US" baseline="0" dirty="0" smtClean="0"/>
+              <a:t> unbiased cn0</a:t>
+            </a:r>
+            <a:endParaRPr lang="en-US" dirty="0"/>
+          </a:p>
+        </p:txBody>
+      </p:sp>
+      <p:sp>
+        <p:nvSpPr>
+          <p:cNvPr id="4" name="Slide Number Placeholder 3"/>
+          <p:cNvSpPr>
+            <a:spLocks noGrp="1"/>
+          </p:cNvSpPr>
+          <p:nvPr>
+            <p:ph type="sldNum" sz="quarter" idx="10"/>
+          </p:nvPr>
+        </p:nvSpPr>
+        <p:spPr/>
+        <p:txBody>
+          <a:bodyPr/>
+          <a:lstStyle/>
+          <a:p>
+            <a:pPr>
+              <a:defRPr/>
+            </a:pPr>
+            <a:fld id="{6E074355-CE0D-4C68-A6CB-C364ED71B33B}" type="slidenum">
+              <a:rPr lang="en-US" smtClean="0"/>
+              <a:pPr>
+                <a:defRPr/>
+              </a:pPr>
+              <a:t>7</a:t>
+            </a:fld>
+            <a:endParaRPr lang="en-US"/>
+          </a:p>
+        </p:txBody>
+      </p:sp>
+    </p:spTree>
+    <p:extLst>
+      <p:ext uri="{BB962C8B-B14F-4D97-AF65-F5344CB8AC3E}">
+        <p14:creationId xmlns:p14="http://schemas.microsoft.com/office/powerpoint/2010/main" val="79077515"/>
+      </p:ext>
+    </p:extLst>
+  </p:cSld>
+  <p:clrMapOvr>
+    <a:masterClrMapping/>
+  </p:clrMapOvr>
+</p:notes>
+</file>
+
+<file path=ppt/notesSlides/notesSlide4.xml><?xml version="1.0" encoding="utf-8"?>
+<p:notes xmlns:a="http://schemas.openxmlformats.org/drawingml/2006/main" xmlns:r="http://schemas.openxmlformats.org/officeDocument/2006/relationships" xmlns:p="http://schemas.openxmlformats.org/presentationml/2006/main">
+  <p:cSld>
+    <p:spTree>
+      <p:nvGrpSpPr>
+        <p:cNvPr id="1" name=""/>
+        <p:cNvGrpSpPr/>
+        <p:nvPr/>
+      </p:nvGrpSpPr>
+      <p:grpSpPr>
+        <a:xfrm>
+          <a:off x="0" y="0"/>
+          <a:ext cx="0" cy="0"/>
+          <a:chOff x="0" y="0"/>
+          <a:chExt cx="0" cy="0"/>
+        </a:xfrm>
+      </p:grpSpPr>
+      <p:sp>
+        <p:nvSpPr>
+          <p:cNvPr id="2" name="Slide Image Placeholder 1"/>
+          <p:cNvSpPr>
+            <a:spLocks noGrp="1" noRot="1" noChangeAspect="1"/>
+          </p:cNvSpPr>
+          <p:nvPr>
+            <p:ph type="sldImg"/>
+          </p:nvPr>
+        </p:nvSpPr>
+        <p:spPr/>
+      </p:sp>
+      <p:sp>
+        <p:nvSpPr>
+          <p:cNvPr id="3" name="Notes Placeholder 2"/>
+          <p:cNvSpPr>
+            <a:spLocks noGrp="1"/>
+          </p:cNvSpPr>
+          <p:nvPr>
+            <p:ph type="body" idx="1"/>
+          </p:nvPr>
+        </p:nvSpPr>
+        <p:spPr/>
+        <p:txBody>
+          <a:bodyPr/>
+          <a:lstStyle/>
+          <a:p>
+            <a:r>
+              <a:rPr lang="en-US" dirty="0" smtClean="0"/>
               <a:t>Given</a:t>
             </a:r>
             <a:r>
@@ -1118,6 +1408,548 @@
     <p:extLst>
       <p:ext uri="{BB962C8B-B14F-4D97-AF65-F5344CB8AC3E}">
         <p14:creationId xmlns:p14="http://schemas.microsoft.com/office/powerpoint/2010/main" val="3253973478"/>
+      </p:ext>
+    </p:extLst>
+  </p:cSld>
+  <p:clrMapOvr>
+    <a:masterClrMapping/>
+  </p:clrMapOvr>
+</p:notes>
+</file>
+
+<file path=ppt/notesSlides/notesSlide5.xml><?xml version="1.0" encoding="utf-8"?>
+<p:notes xmlns:a="http://schemas.openxmlformats.org/drawingml/2006/main" xmlns:r="http://schemas.openxmlformats.org/officeDocument/2006/relationships" xmlns:p="http://schemas.openxmlformats.org/presentationml/2006/main">
+  <p:cSld>
+    <p:spTree>
+      <p:nvGrpSpPr>
+        <p:cNvPr id="1" name=""/>
+        <p:cNvGrpSpPr/>
+        <p:nvPr/>
+      </p:nvGrpSpPr>
+      <p:grpSpPr>
+        <a:xfrm>
+          <a:off x="0" y="0"/>
+          <a:ext cx="0" cy="0"/>
+          <a:chOff x="0" y="0"/>
+          <a:chExt cx="0" cy="0"/>
+        </a:xfrm>
+      </p:grpSpPr>
+      <p:sp>
+        <p:nvSpPr>
+          <p:cNvPr id="2" name="Slide Image Placeholder 1"/>
+          <p:cNvSpPr>
+            <a:spLocks noGrp="1" noRot="1" noChangeAspect="1"/>
+          </p:cNvSpPr>
+          <p:nvPr>
+            <p:ph type="sldImg"/>
+          </p:nvPr>
+        </p:nvSpPr>
+        <p:spPr/>
+      </p:sp>
+      <p:sp>
+        <p:nvSpPr>
+          <p:cNvPr id="3" name="Notes Placeholder 2"/>
+          <p:cNvSpPr>
+            <a:spLocks noGrp="1"/>
+          </p:cNvSpPr>
+          <p:nvPr>
+            <p:ph type="body" idx="1"/>
+          </p:nvPr>
+        </p:nvSpPr>
+        <p:spPr/>
+        <p:txBody>
+          <a:bodyPr/>
+          <a:lstStyle/>
+          <a:p>
+            <a:r>
+              <a:rPr lang="en-US" dirty="0" smtClean="0"/>
+              <a:t>Actual </a:t>
+            </a:r>
+            <a:r>
+              <a:rPr lang="en-US" dirty="0" err="1" smtClean="0"/>
+              <a:t>sv</a:t>
+            </a:r>
+            <a:r>
+              <a:rPr lang="en-US" dirty="0" smtClean="0"/>
+              <a:t> location at</a:t>
+            </a:r>
+            <a:r>
+              <a:rPr lang="en-US" baseline="0" dirty="0" smtClean="0"/>
+              <a:t> given time, but modeled observer location above north pole</a:t>
+            </a:r>
+            <a:endParaRPr lang="en-US" dirty="0"/>
+          </a:p>
+        </p:txBody>
+      </p:sp>
+      <p:sp>
+        <p:nvSpPr>
+          <p:cNvPr id="4" name="Slide Number Placeholder 3"/>
+          <p:cNvSpPr>
+            <a:spLocks noGrp="1"/>
+          </p:cNvSpPr>
+          <p:nvPr>
+            <p:ph type="sldNum" sz="quarter" idx="10"/>
+          </p:nvPr>
+        </p:nvSpPr>
+        <p:spPr/>
+        <p:txBody>
+          <a:bodyPr/>
+          <a:lstStyle/>
+          <a:p>
+            <a:pPr>
+              <a:defRPr/>
+            </a:pPr>
+            <a:fld id="{6E074355-CE0D-4C68-A6CB-C364ED71B33B}" type="slidenum">
+              <a:rPr lang="en-US" smtClean="0"/>
+              <a:pPr>
+                <a:defRPr/>
+              </a:pPr>
+              <a:t>11</a:t>
+            </a:fld>
+            <a:endParaRPr lang="en-US"/>
+          </a:p>
+        </p:txBody>
+      </p:sp>
+    </p:spTree>
+    <p:extLst>
+      <p:ext uri="{BB962C8B-B14F-4D97-AF65-F5344CB8AC3E}">
+        <p14:creationId xmlns:p14="http://schemas.microsoft.com/office/powerpoint/2010/main" val="289568024"/>
+      </p:ext>
+    </p:extLst>
+  </p:cSld>
+  <p:clrMapOvr>
+    <a:masterClrMapping/>
+  </p:clrMapOvr>
+</p:notes>
+</file>
+
+<file path=ppt/notesSlides/notesSlide6.xml><?xml version="1.0" encoding="utf-8"?>
+<p:notes xmlns:a="http://schemas.openxmlformats.org/drawingml/2006/main" xmlns:r="http://schemas.openxmlformats.org/officeDocument/2006/relationships" xmlns:p="http://schemas.openxmlformats.org/presentationml/2006/main">
+  <p:cSld>
+    <p:spTree>
+      <p:nvGrpSpPr>
+        <p:cNvPr id="1" name=""/>
+        <p:cNvGrpSpPr/>
+        <p:nvPr/>
+      </p:nvGrpSpPr>
+      <p:grpSpPr>
+        <a:xfrm>
+          <a:off x="0" y="0"/>
+          <a:ext cx="0" cy="0"/>
+          <a:chOff x="0" y="0"/>
+          <a:chExt cx="0" cy="0"/>
+        </a:xfrm>
+      </p:grpSpPr>
+      <p:sp>
+        <p:nvSpPr>
+          <p:cNvPr id="2" name="Slide Image Placeholder 1"/>
+          <p:cNvSpPr>
+            <a:spLocks noGrp="1" noRot="1" noChangeAspect="1"/>
+          </p:cNvSpPr>
+          <p:nvPr>
+            <p:ph type="sldImg"/>
+          </p:nvPr>
+        </p:nvSpPr>
+        <p:spPr/>
+      </p:sp>
+      <p:sp>
+        <p:nvSpPr>
+          <p:cNvPr id="3" name="Notes Placeholder 2"/>
+          <p:cNvSpPr>
+            <a:spLocks noGrp="1"/>
+          </p:cNvSpPr>
+          <p:nvPr>
+            <p:ph type="body" idx="1"/>
+          </p:nvPr>
+        </p:nvSpPr>
+        <p:spPr/>
+        <p:txBody>
+          <a:bodyPr/>
+          <a:lstStyle/>
+          <a:p>
+            <a:r>
+              <a:rPr lang="en-US" dirty="0" smtClean="0"/>
+              <a:t>Note drop off corresponding to when theta&gt;90</a:t>
+            </a:r>
+            <a:r>
+              <a:rPr lang="en-US" baseline="0" dirty="0" smtClean="0"/>
+              <a:t> on previous slide</a:t>
+            </a:r>
+            <a:endParaRPr lang="en-US" dirty="0"/>
+          </a:p>
+        </p:txBody>
+      </p:sp>
+      <p:sp>
+        <p:nvSpPr>
+          <p:cNvPr id="4" name="Slide Number Placeholder 3"/>
+          <p:cNvSpPr>
+            <a:spLocks noGrp="1"/>
+          </p:cNvSpPr>
+          <p:nvPr>
+            <p:ph type="sldNum" sz="quarter" idx="10"/>
+          </p:nvPr>
+        </p:nvSpPr>
+        <p:spPr/>
+        <p:txBody>
+          <a:bodyPr/>
+          <a:lstStyle/>
+          <a:p>
+            <a:pPr>
+              <a:defRPr/>
+            </a:pPr>
+            <a:fld id="{6E074355-CE0D-4C68-A6CB-C364ED71B33B}" type="slidenum">
+              <a:rPr lang="en-US" smtClean="0"/>
+              <a:pPr>
+                <a:defRPr/>
+              </a:pPr>
+              <a:t>12</a:t>
+            </a:fld>
+            <a:endParaRPr lang="en-US"/>
+          </a:p>
+        </p:txBody>
+      </p:sp>
+    </p:spTree>
+    <p:extLst>
+      <p:ext uri="{BB962C8B-B14F-4D97-AF65-F5344CB8AC3E}">
+        <p14:creationId xmlns:p14="http://schemas.microsoft.com/office/powerpoint/2010/main" val="2045638501"/>
+      </p:ext>
+    </p:extLst>
+  </p:cSld>
+  <p:clrMapOvr>
+    <a:masterClrMapping/>
+  </p:clrMapOvr>
+</p:notes>
+</file>
+
+<file path=ppt/notesSlides/notesSlide7.xml><?xml version="1.0" encoding="utf-8"?>
+<p:notes xmlns:a="http://schemas.openxmlformats.org/drawingml/2006/main" xmlns:r="http://schemas.openxmlformats.org/officeDocument/2006/relationships" xmlns:p="http://schemas.openxmlformats.org/presentationml/2006/main">
+  <p:cSld>
+    <p:spTree>
+      <p:nvGrpSpPr>
+        <p:cNvPr id="1" name=""/>
+        <p:cNvGrpSpPr/>
+        <p:nvPr/>
+      </p:nvGrpSpPr>
+      <p:grpSpPr>
+        <a:xfrm>
+          <a:off x="0" y="0"/>
+          <a:ext cx="0" cy="0"/>
+          <a:chOff x="0" y="0"/>
+          <a:chExt cx="0" cy="0"/>
+        </a:xfrm>
+      </p:grpSpPr>
+      <p:sp>
+        <p:nvSpPr>
+          <p:cNvPr id="2" name="Slide Image Placeholder 1"/>
+          <p:cNvSpPr>
+            <a:spLocks noGrp="1" noRot="1" noChangeAspect="1"/>
+          </p:cNvSpPr>
+          <p:nvPr>
+            <p:ph type="sldImg"/>
+          </p:nvPr>
+        </p:nvSpPr>
+        <p:spPr/>
+      </p:sp>
+      <p:sp>
+        <p:nvSpPr>
+          <p:cNvPr id="3" name="Notes Placeholder 2"/>
+          <p:cNvSpPr>
+            <a:spLocks noGrp="1"/>
+          </p:cNvSpPr>
+          <p:nvPr>
+            <p:ph type="body" idx="1"/>
+          </p:nvPr>
+        </p:nvSpPr>
+        <p:spPr/>
+        <p:txBody>
+          <a:bodyPr/>
+          <a:lstStyle/>
+          <a:p>
+            <a:r>
+              <a:rPr lang="en-US" dirty="0" smtClean="0"/>
+              <a:t>Unbiased c/n0 – not accounting for </a:t>
+            </a:r>
+            <a:r>
+              <a:rPr lang="en-US" dirty="0" err="1" smtClean="0"/>
+              <a:t>rxgain</a:t>
+            </a:r>
+            <a:r>
+              <a:rPr lang="en-US" baseline="0" dirty="0" smtClean="0"/>
+              <a:t> or </a:t>
+            </a:r>
+            <a:r>
+              <a:rPr lang="en-US" baseline="0" dirty="0" err="1" smtClean="0"/>
+              <a:t>rxnoise</a:t>
+            </a:r>
+            <a:r>
+              <a:rPr lang="en-US" baseline="0" dirty="0" smtClean="0"/>
+              <a:t> or thermal noise</a:t>
+            </a:r>
+            <a:endParaRPr lang="en-US" dirty="0"/>
+          </a:p>
+        </p:txBody>
+      </p:sp>
+      <p:sp>
+        <p:nvSpPr>
+          <p:cNvPr id="4" name="Slide Number Placeholder 3"/>
+          <p:cNvSpPr>
+            <a:spLocks noGrp="1"/>
+          </p:cNvSpPr>
+          <p:nvPr>
+            <p:ph type="sldNum" sz="quarter" idx="10"/>
+          </p:nvPr>
+        </p:nvSpPr>
+        <p:spPr/>
+        <p:txBody>
+          <a:bodyPr/>
+          <a:lstStyle/>
+          <a:p>
+            <a:pPr>
+              <a:defRPr/>
+            </a:pPr>
+            <a:fld id="{6E074355-CE0D-4C68-A6CB-C364ED71B33B}" type="slidenum">
+              <a:rPr lang="en-US" smtClean="0"/>
+              <a:pPr>
+                <a:defRPr/>
+              </a:pPr>
+              <a:t>13</a:t>
+            </a:fld>
+            <a:endParaRPr lang="en-US"/>
+          </a:p>
+        </p:txBody>
+      </p:sp>
+    </p:spTree>
+    <p:extLst>
+      <p:ext uri="{BB962C8B-B14F-4D97-AF65-F5344CB8AC3E}">
+        <p14:creationId xmlns:p14="http://schemas.microsoft.com/office/powerpoint/2010/main" val="606444206"/>
+      </p:ext>
+    </p:extLst>
+  </p:cSld>
+  <p:clrMapOvr>
+    <a:masterClrMapping/>
+  </p:clrMapOvr>
+</p:notes>
+</file>
+
+<file path=ppt/notesSlides/notesSlide8.xml><?xml version="1.0" encoding="utf-8"?>
+<p:notes xmlns:a="http://schemas.openxmlformats.org/drawingml/2006/main" xmlns:r="http://schemas.openxmlformats.org/officeDocument/2006/relationships" xmlns:p="http://schemas.openxmlformats.org/presentationml/2006/main">
+  <p:cSld>
+    <p:spTree>
+      <p:nvGrpSpPr>
+        <p:cNvPr id="1" name=""/>
+        <p:cNvGrpSpPr/>
+        <p:nvPr/>
+      </p:nvGrpSpPr>
+      <p:grpSpPr>
+        <a:xfrm>
+          <a:off x="0" y="0"/>
+          <a:ext cx="0" cy="0"/>
+          <a:chOff x="0" y="0"/>
+          <a:chExt cx="0" cy="0"/>
+        </a:xfrm>
+      </p:grpSpPr>
+      <p:sp>
+        <p:nvSpPr>
+          <p:cNvPr id="2" name="Slide Image Placeholder 1"/>
+          <p:cNvSpPr>
+            <a:spLocks noGrp="1" noRot="1" noChangeAspect="1"/>
+          </p:cNvSpPr>
+          <p:nvPr>
+            <p:ph type="sldImg"/>
+          </p:nvPr>
+        </p:nvSpPr>
+        <p:spPr/>
+      </p:sp>
+      <p:sp>
+        <p:nvSpPr>
+          <p:cNvPr id="3" name="Notes Placeholder 2"/>
+          <p:cNvSpPr>
+            <a:spLocks noGrp="1"/>
+          </p:cNvSpPr>
+          <p:nvPr>
+            <p:ph type="body" idx="1"/>
+          </p:nvPr>
+        </p:nvSpPr>
+        <p:spPr/>
+        <p:txBody>
+          <a:bodyPr/>
+          <a:lstStyle/>
+          <a:p>
+            <a:r>
+              <a:rPr lang="en-US" dirty="0" smtClean="0"/>
+              <a:t>0.24</a:t>
+            </a:r>
+            <a:r>
+              <a:rPr lang="en-US" baseline="0" dirty="0" smtClean="0"/>
+              <a:t> </a:t>
+            </a:r>
+            <a:r>
+              <a:rPr lang="en-US" dirty="0" err="1" smtClean="0"/>
+              <a:t>sats</a:t>
+            </a:r>
+            <a:r>
+              <a:rPr lang="en-US" baseline="0" dirty="0" smtClean="0"/>
+              <a:t> on average – every 15 </a:t>
+            </a:r>
+            <a:r>
+              <a:rPr lang="en-US" baseline="0" dirty="0" err="1" smtClean="0"/>
+              <a:t>mins</a:t>
+            </a:r>
+            <a:r>
+              <a:rPr lang="en-US" baseline="0" dirty="0" smtClean="0"/>
+              <a:t>, threshold = 40 </a:t>
+            </a:r>
+            <a:r>
+              <a:rPr lang="en-US" baseline="0" dirty="0" err="1" smtClean="0"/>
+              <a:t>dbHz</a:t>
+            </a:r>
+            <a:endParaRPr lang="en-US" dirty="0"/>
+          </a:p>
+        </p:txBody>
+      </p:sp>
+      <p:sp>
+        <p:nvSpPr>
+          <p:cNvPr id="4" name="Slide Number Placeholder 3"/>
+          <p:cNvSpPr>
+            <a:spLocks noGrp="1"/>
+          </p:cNvSpPr>
+          <p:nvPr>
+            <p:ph type="sldNum" sz="quarter" idx="10"/>
+          </p:nvPr>
+        </p:nvSpPr>
+        <p:spPr/>
+        <p:txBody>
+          <a:bodyPr/>
+          <a:lstStyle/>
+          <a:p>
+            <a:pPr>
+              <a:defRPr/>
+            </a:pPr>
+            <a:fld id="{6E074355-CE0D-4C68-A6CB-C364ED71B33B}" type="slidenum">
+              <a:rPr lang="en-US" smtClean="0"/>
+              <a:pPr>
+                <a:defRPr/>
+              </a:pPr>
+              <a:t>17</a:t>
+            </a:fld>
+            <a:endParaRPr lang="en-US"/>
+          </a:p>
+        </p:txBody>
+      </p:sp>
+    </p:spTree>
+    <p:extLst>
+      <p:ext uri="{BB962C8B-B14F-4D97-AF65-F5344CB8AC3E}">
+        <p14:creationId xmlns:p14="http://schemas.microsoft.com/office/powerpoint/2010/main" val="4043896896"/>
+      </p:ext>
+    </p:extLst>
+  </p:cSld>
+  <p:clrMapOvr>
+    <a:masterClrMapping/>
+  </p:clrMapOvr>
+</p:notes>
+</file>
+
+<file path=ppt/notesSlides/notesSlide9.xml><?xml version="1.0" encoding="utf-8"?>
+<p:notes xmlns:a="http://schemas.openxmlformats.org/drawingml/2006/main" xmlns:r="http://schemas.openxmlformats.org/officeDocument/2006/relationships" xmlns:p="http://schemas.openxmlformats.org/presentationml/2006/main">
+  <p:cSld>
+    <p:spTree>
+      <p:nvGrpSpPr>
+        <p:cNvPr id="1" name=""/>
+        <p:cNvGrpSpPr/>
+        <p:nvPr/>
+      </p:nvGrpSpPr>
+      <p:grpSpPr>
+        <a:xfrm>
+          <a:off x="0" y="0"/>
+          <a:ext cx="0" cy="0"/>
+          <a:chOff x="0" y="0"/>
+          <a:chExt cx="0" cy="0"/>
+        </a:xfrm>
+      </p:grpSpPr>
+      <p:sp>
+        <p:nvSpPr>
+          <p:cNvPr id="2" name="Slide Image Placeholder 1"/>
+          <p:cNvSpPr>
+            <a:spLocks noGrp="1" noRot="1" noChangeAspect="1"/>
+          </p:cNvSpPr>
+          <p:nvPr>
+            <p:ph type="sldImg"/>
+          </p:nvPr>
+        </p:nvSpPr>
+        <p:spPr/>
+      </p:sp>
+      <p:sp>
+        <p:nvSpPr>
+          <p:cNvPr id="3" name="Notes Placeholder 2"/>
+          <p:cNvSpPr>
+            <a:spLocks noGrp="1"/>
+          </p:cNvSpPr>
+          <p:nvPr>
+            <p:ph type="body" idx="1"/>
+          </p:nvPr>
+        </p:nvSpPr>
+        <p:spPr/>
+        <p:txBody>
+          <a:bodyPr/>
+          <a:lstStyle/>
+          <a:p>
+            <a:r>
+              <a:rPr lang="en-US" dirty="0" smtClean="0"/>
+              <a:t>2.5 </a:t>
+            </a:r>
+            <a:r>
+              <a:rPr lang="en-US" dirty="0" err="1" smtClean="0"/>
+              <a:t>sats</a:t>
+            </a:r>
+            <a:r>
+              <a:rPr lang="en-US" dirty="0" smtClean="0"/>
+              <a:t> on average, lowered threshold to 25</a:t>
+            </a:r>
+            <a:r>
+              <a:rPr lang="en-US" baseline="0" dirty="0" smtClean="0"/>
+              <a:t> </a:t>
+            </a:r>
+            <a:r>
+              <a:rPr lang="en-US" baseline="0" dirty="0" err="1" smtClean="0"/>
+              <a:t>dbHz</a:t>
+            </a:r>
+            <a:endParaRPr lang="en-US" dirty="0"/>
+          </a:p>
+        </p:txBody>
+      </p:sp>
+      <p:sp>
+        <p:nvSpPr>
+          <p:cNvPr id="4" name="Slide Number Placeholder 3"/>
+          <p:cNvSpPr>
+            <a:spLocks noGrp="1"/>
+          </p:cNvSpPr>
+          <p:nvPr>
+            <p:ph type="sldNum" sz="quarter" idx="10"/>
+          </p:nvPr>
+        </p:nvSpPr>
+        <p:spPr/>
+        <p:txBody>
+          <a:bodyPr/>
+          <a:lstStyle/>
+          <a:p>
+            <a:pPr>
+              <a:defRPr/>
+            </a:pPr>
+            <a:fld id="{6E074355-CE0D-4C68-A6CB-C364ED71B33B}" type="slidenum">
+              <a:rPr lang="en-US" smtClean="0"/>
+              <a:pPr>
+                <a:defRPr/>
+              </a:pPr>
+              <a:t>18</a:t>
+            </a:fld>
+            <a:endParaRPr lang="en-US"/>
+          </a:p>
+        </p:txBody>
+      </p:sp>
+    </p:spTree>
+    <p:extLst>
+      <p:ext uri="{BB962C8B-B14F-4D97-AF65-F5344CB8AC3E}">
+        <p14:creationId xmlns:p14="http://schemas.microsoft.com/office/powerpoint/2010/main" val="4124153093"/>
       </p:ext>
     </p:extLst>
   </p:cSld>
@@ -4403,25 +5235,64 @@
           </a:p>
         </p:txBody>
       </p:sp>
-      <p:sp>
-        <p:nvSpPr>
-          <p:cNvPr id="3" name="Content Placeholder 2"/>
-          <p:cNvSpPr>
-            <a:spLocks noGrp="1"/>
-          </p:cNvSpPr>
-          <p:nvPr>
-            <p:ph idx="1"/>
-          </p:nvPr>
-        </p:nvSpPr>
-        <p:spPr/>
-        <p:txBody>
-          <a:bodyPr/>
-          <a:lstStyle/>
-          <a:p>
-            <a:endParaRPr lang="en-US"/>
-          </a:p>
-        </p:txBody>
-      </p:sp>
+      <p:pic>
+        <p:nvPicPr>
+          <p:cNvPr id="4" name="Content Placeholder 3"/>
+          <p:cNvPicPr>
+            <a:picLocks noGrp="1" noChangeAspect="1"/>
+          </p:cNvPicPr>
+          <p:nvPr>
+            <p:ph sz="half" idx="1"/>
+          </p:nvPr>
+        </p:nvPicPr>
+        <p:blipFill>
+          <a:blip r:embed="rId3">
+            <a:extLst>
+              <a:ext uri="{28A0092B-C50C-407E-A947-70E740481C1C}">
+                <a14:useLocalDpi xmlns:a14="http://schemas.microsoft.com/office/drawing/2010/main" val="0"/>
+              </a:ext>
+            </a:extLst>
+          </a:blip>
+          <a:stretch>
+            <a:fillRect/>
+          </a:stretch>
+        </p:blipFill>
+        <p:spPr>
+          <a:xfrm>
+            <a:off x="457200" y="2890621"/>
+            <a:ext cx="4038600" cy="3027795"/>
+          </a:xfrm>
+        </p:spPr>
+      </p:pic>
+      <p:pic>
+        <p:nvPicPr>
+          <p:cNvPr id="7" name="Content Placeholder 6"/>
+          <p:cNvPicPr>
+            <a:picLocks noGrp="1" noChangeAspect="1"/>
+          </p:cNvPicPr>
+          <p:nvPr>
+            <p:ph sz="half" idx="2"/>
+          </p:nvPr>
+        </p:nvPicPr>
+        <p:blipFill>
+          <a:blip r:embed="rId4">
+            <a:extLst>
+              <a:ext uri="{28A0092B-C50C-407E-A947-70E740481C1C}">
+                <a14:useLocalDpi xmlns:a14="http://schemas.microsoft.com/office/drawing/2010/main" val="0"/>
+              </a:ext>
+            </a:extLst>
+          </a:blip>
+          <a:stretch>
+            <a:fillRect/>
+          </a:stretch>
+        </p:blipFill>
+        <p:spPr>
+          <a:xfrm>
+            <a:off x="4648200" y="2890621"/>
+            <a:ext cx="4038600" cy="3027795"/>
+          </a:xfrm>
+        </p:spPr>
+      </p:pic>
     </p:spTree>
     <p:extLst>
       <p:ext uri="{BB962C8B-B14F-4D97-AF65-F5344CB8AC3E}">
@@ -4469,41 +5340,58 @@
           <a:p>
             <a:r>
               <a:rPr lang="en-US" dirty="0" smtClean="0"/>
-              <a:t>Many SVs</a:t>
+              <a:t>Single SV</a:t>
             </a:r>
             <a:endParaRPr lang="en-US" dirty="0"/>
           </a:p>
         </p:txBody>
       </p:sp>
-      <p:sp>
-        <p:nvSpPr>
-          <p:cNvPr id="3" name="Content Placeholder 2"/>
-          <p:cNvSpPr>
-            <a:spLocks noGrp="1"/>
-          </p:cNvSpPr>
+      <p:pic>
+        <p:nvPicPr>
+          <p:cNvPr id="9" name="Content Placeholder 8"/>
+          <p:cNvPicPr>
+            <a:picLocks noGrp="1" noChangeAspect="1"/>
+          </p:cNvPicPr>
           <p:nvPr>
             <p:ph idx="1"/>
           </p:nvPr>
-        </p:nvSpPr>
-        <p:spPr/>
-        <p:txBody>
-          <a:bodyPr/>
-          <a:lstStyle/>
-          <a:p>
-            <a:endParaRPr lang="en-US"/>
-          </a:p>
-        </p:txBody>
-      </p:sp>
+        </p:nvPicPr>
+        <p:blipFill>
+          <a:blip r:embed="rId3">
+            <a:extLst>
+              <a:ext uri="{28A0092B-C50C-407E-A947-70E740481C1C}">
+                <a14:useLocalDpi xmlns:a14="http://schemas.microsoft.com/office/drawing/2010/main" val="0"/>
+              </a:ext>
+            </a:extLst>
+          </a:blip>
+          <a:stretch>
+            <a:fillRect/>
+          </a:stretch>
+        </p:blipFill>
+        <p:spPr>
+          <a:xfrm>
+            <a:off x="1980212" y="2362200"/>
+            <a:ext cx="5183575" cy="3886200"/>
+          </a:xfrm>
+        </p:spPr>
+      </p:pic>
     </p:spTree>
     <p:extLst>
       <p:ext uri="{BB962C8B-B14F-4D97-AF65-F5344CB8AC3E}">
-        <p14:creationId xmlns:p14="http://schemas.microsoft.com/office/powerpoint/2010/main" val="4067917822"/>
+        <p14:creationId xmlns:p14="http://schemas.microsoft.com/office/powerpoint/2010/main" val="3632070743"/>
       </p:ext>
     </p:extLst>
   </p:cSld>
   <p:clrMapOvr>
     <a:masterClrMapping/>
   </p:clrMapOvr>
+  <p:timing>
+    <p:tnLst>
+      <p:par>
+        <p:cTn id="1" dur="indefinite" restart="never" nodeType="tmRoot"/>
+      </p:par>
+    </p:tnLst>
+  </p:timing>
 </p:sld>
 </file>
 
@@ -4541,41 +5429,58 @@
           <a:p>
             <a:r>
               <a:rPr lang="en-US" dirty="0" smtClean="0"/>
-              <a:t>DOP</a:t>
+              <a:t>Single SV</a:t>
             </a:r>
             <a:endParaRPr lang="en-US" dirty="0"/>
           </a:p>
         </p:txBody>
       </p:sp>
-      <p:sp>
-        <p:nvSpPr>
-          <p:cNvPr id="3" name="Content Placeholder 2"/>
-          <p:cNvSpPr>
-            <a:spLocks noGrp="1"/>
-          </p:cNvSpPr>
+      <p:pic>
+        <p:nvPicPr>
+          <p:cNvPr id="4" name="Content Placeholder 3"/>
+          <p:cNvPicPr>
+            <a:picLocks noGrp="1" noChangeAspect="1"/>
+          </p:cNvPicPr>
           <p:nvPr>
             <p:ph idx="1"/>
           </p:nvPr>
-        </p:nvSpPr>
-        <p:spPr/>
-        <p:txBody>
-          <a:bodyPr/>
-          <a:lstStyle/>
-          <a:p>
-            <a:endParaRPr lang="en-US"/>
-          </a:p>
-        </p:txBody>
-      </p:sp>
+        </p:nvPicPr>
+        <p:blipFill>
+          <a:blip r:embed="rId3">
+            <a:extLst>
+              <a:ext uri="{28A0092B-C50C-407E-A947-70E740481C1C}">
+                <a14:useLocalDpi xmlns:a14="http://schemas.microsoft.com/office/drawing/2010/main" val="0"/>
+              </a:ext>
+            </a:extLst>
+          </a:blip>
+          <a:stretch>
+            <a:fillRect/>
+          </a:stretch>
+        </p:blipFill>
+        <p:spPr>
+          <a:xfrm>
+            <a:off x="1981200" y="2362200"/>
+            <a:ext cx="5181599" cy="3886200"/>
+          </a:xfrm>
+        </p:spPr>
+      </p:pic>
     </p:spTree>
     <p:extLst>
       <p:ext uri="{BB962C8B-B14F-4D97-AF65-F5344CB8AC3E}">
-        <p14:creationId xmlns:p14="http://schemas.microsoft.com/office/powerpoint/2010/main" val="2124543193"/>
+        <p14:creationId xmlns:p14="http://schemas.microsoft.com/office/powerpoint/2010/main" val="2313472051"/>
       </p:ext>
     </p:extLst>
   </p:cSld>
   <p:clrMapOvr>
     <a:masterClrMapping/>
   </p:clrMapOvr>
+  <p:timing>
+    <p:tnLst>
+      <p:par>
+        <p:cTn id="1" dur="indefinite" restart="never" nodeType="tmRoot"/>
+      </p:par>
+    </p:tnLst>
+  </p:timing>
 </p:sld>
 </file>
 
@@ -4613,41 +5518,58 @@
           <a:p>
             <a:r>
               <a:rPr lang="en-US" dirty="0" smtClean="0"/>
-              <a:t>AO40 Replication</a:t>
+              <a:t>Single SV</a:t>
             </a:r>
             <a:endParaRPr lang="en-US" dirty="0"/>
           </a:p>
         </p:txBody>
       </p:sp>
-      <p:sp>
-        <p:nvSpPr>
-          <p:cNvPr id="3" name="Content Placeholder 2"/>
-          <p:cNvSpPr>
-            <a:spLocks noGrp="1"/>
-          </p:cNvSpPr>
+      <p:pic>
+        <p:nvPicPr>
+          <p:cNvPr id="5" name="Content Placeholder 4"/>
+          <p:cNvPicPr>
+            <a:picLocks noGrp="1" noChangeAspect="1"/>
+          </p:cNvPicPr>
           <p:nvPr>
             <p:ph idx="1"/>
           </p:nvPr>
-        </p:nvSpPr>
-        <p:spPr/>
-        <p:txBody>
-          <a:bodyPr/>
-          <a:lstStyle/>
-          <a:p>
-            <a:endParaRPr lang="en-US"/>
-          </a:p>
-        </p:txBody>
-      </p:sp>
+        </p:nvPicPr>
+        <p:blipFill>
+          <a:blip r:embed="rId2">
+            <a:extLst>
+              <a:ext uri="{28A0092B-C50C-407E-A947-70E740481C1C}">
+                <a14:useLocalDpi xmlns:a14="http://schemas.microsoft.com/office/drawing/2010/main" val="0"/>
+              </a:ext>
+            </a:extLst>
+          </a:blip>
+          <a:stretch>
+            <a:fillRect/>
+          </a:stretch>
+        </p:blipFill>
+        <p:spPr>
+          <a:xfrm>
+            <a:off x="1981200" y="2362200"/>
+            <a:ext cx="5181599" cy="3886200"/>
+          </a:xfrm>
+        </p:spPr>
+      </p:pic>
     </p:spTree>
     <p:extLst>
       <p:ext uri="{BB962C8B-B14F-4D97-AF65-F5344CB8AC3E}">
-        <p14:creationId xmlns:p14="http://schemas.microsoft.com/office/powerpoint/2010/main" val="3823892686"/>
+        <p14:creationId xmlns:p14="http://schemas.microsoft.com/office/powerpoint/2010/main" val="2058595226"/>
       </p:ext>
     </p:extLst>
   </p:cSld>
   <p:clrMapOvr>
     <a:masterClrMapping/>
   </p:clrMapOvr>
+  <p:timing>
+    <p:tnLst>
+      <p:par>
+        <p:cTn id="1" dur="indefinite" restart="never" nodeType="tmRoot"/>
+      </p:par>
+    </p:tnLst>
+  </p:timing>
 </p:sld>
 </file>
 
@@ -4670,7 +5592,7 @@
       </p:grpSpPr>
       <p:sp>
         <p:nvSpPr>
-          <p:cNvPr id="4" name="Title 3"/>
+          <p:cNvPr id="2" name="Title 1"/>
           <p:cNvSpPr>
             <a:spLocks noGrp="1"/>
           </p:cNvSpPr>
@@ -4685,7 +5607,7 @@
           <a:p>
             <a:r>
               <a:rPr lang="en-US" dirty="0" smtClean="0"/>
-              <a:t>Conclusions</a:t>
+              <a:t>Many SVs</a:t>
             </a:r>
             <a:endParaRPr lang="en-US" dirty="0"/>
           </a:p>
@@ -4693,12 +5615,12 @@
       </p:sp>
       <p:sp>
         <p:nvSpPr>
-          <p:cNvPr id="5" name="Text Placeholder 4"/>
-          <p:cNvSpPr>
-            <a:spLocks noGrp="1"/>
-          </p:cNvSpPr>
-          <p:nvPr>
-            <p:ph type="body" idx="1"/>
+          <p:cNvPr id="3" name="Content Placeholder 2"/>
+          <p:cNvSpPr>
+            <a:spLocks noGrp="1"/>
+          </p:cNvSpPr>
+          <p:nvPr>
+            <p:ph idx="1"/>
           </p:nvPr>
         </p:nvSpPr>
         <p:spPr/>
@@ -4713,7 +5635,7 @@
     </p:spTree>
     <p:extLst>
       <p:ext uri="{BB962C8B-B14F-4D97-AF65-F5344CB8AC3E}">
-        <p14:creationId xmlns:p14="http://schemas.microsoft.com/office/powerpoint/2010/main" val="1583679842"/>
+        <p14:creationId xmlns:p14="http://schemas.microsoft.com/office/powerpoint/2010/main" val="4067917822"/>
       </p:ext>
     </p:extLst>
   </p:cSld>
@@ -4742,7 +5664,7 @@
       </p:grpSpPr>
       <p:sp>
         <p:nvSpPr>
-          <p:cNvPr id="4" name="Title 3"/>
+          <p:cNvPr id="2" name="Title 1"/>
           <p:cNvSpPr>
             <a:spLocks noGrp="1"/>
           </p:cNvSpPr>
@@ -4757,7 +5679,7 @@
           <a:p>
             <a:r>
               <a:rPr lang="en-US" dirty="0" smtClean="0"/>
-              <a:t>Observability</a:t>
+              <a:t>DOP</a:t>
             </a:r>
             <a:endParaRPr lang="en-US" dirty="0"/>
           </a:p>
@@ -4765,7 +5687,7 @@
       </p:sp>
       <p:sp>
         <p:nvSpPr>
-          <p:cNvPr id="5" name="Content Placeholder 4"/>
+          <p:cNvPr id="3" name="Content Placeholder 2"/>
           <p:cNvSpPr>
             <a:spLocks noGrp="1"/>
           </p:cNvSpPr>
@@ -4785,7 +5707,7 @@
     </p:spTree>
     <p:extLst>
       <p:ext uri="{BB962C8B-B14F-4D97-AF65-F5344CB8AC3E}">
-        <p14:creationId xmlns:p14="http://schemas.microsoft.com/office/powerpoint/2010/main" val="3371245903"/>
+        <p14:creationId xmlns:p14="http://schemas.microsoft.com/office/powerpoint/2010/main" val="2124543193"/>
       </p:ext>
     </p:extLst>
   </p:cSld>
@@ -4829,6 +5751,823 @@
           <a:p>
             <a:r>
               <a:rPr lang="en-US" dirty="0" smtClean="0"/>
+              <a:t>AO40 Replication</a:t>
+            </a:r>
+            <a:endParaRPr lang="en-US" dirty="0"/>
+          </a:p>
+        </p:txBody>
+      </p:sp>
+      <p:pic>
+        <p:nvPicPr>
+          <p:cNvPr id="4" name="Content Placeholder 3"/>
+          <p:cNvPicPr>
+            <a:picLocks noGrp="1" noChangeAspect="1"/>
+          </p:cNvPicPr>
+          <p:nvPr>
+            <p:ph idx="1"/>
+          </p:nvPr>
+        </p:nvPicPr>
+        <p:blipFill>
+          <a:blip r:embed="rId3">
+            <a:extLst>
+              <a:ext uri="{28A0092B-C50C-407E-A947-70E740481C1C}">
+                <a14:useLocalDpi xmlns:a14="http://schemas.microsoft.com/office/drawing/2010/main" val="0"/>
+              </a:ext>
+            </a:extLst>
+          </a:blip>
+          <a:stretch>
+            <a:fillRect/>
+          </a:stretch>
+        </p:blipFill>
+        <p:spPr>
+          <a:xfrm>
+            <a:off x="1980212" y="2362200"/>
+            <a:ext cx="5183575" cy="3886200"/>
+          </a:xfrm>
+        </p:spPr>
+      </p:pic>
+    </p:spTree>
+    <p:extLst>
+      <p:ext uri="{BB962C8B-B14F-4D97-AF65-F5344CB8AC3E}">
+        <p14:creationId xmlns:p14="http://schemas.microsoft.com/office/powerpoint/2010/main" val="3823892686"/>
+      </p:ext>
+    </p:extLst>
+  </p:cSld>
+  <p:clrMapOvr>
+    <a:masterClrMapping/>
+  </p:clrMapOvr>
+</p:sld>
+</file>
+
+<file path=ppt/slides/slide18.xml><?xml version="1.0" encoding="utf-8"?>
+<p:sld xmlns:a="http://schemas.openxmlformats.org/drawingml/2006/main" xmlns:r="http://schemas.openxmlformats.org/officeDocument/2006/relationships" xmlns:p="http://schemas.openxmlformats.org/presentationml/2006/main">
+  <p:cSld>
+    <p:spTree>
+      <p:nvGrpSpPr>
+        <p:cNvPr id="1" name=""/>
+        <p:cNvGrpSpPr/>
+        <p:nvPr/>
+      </p:nvGrpSpPr>
+      <p:grpSpPr>
+        <a:xfrm>
+          <a:off x="0" y="0"/>
+          <a:ext cx="0" cy="0"/>
+          <a:chOff x="0" y="0"/>
+          <a:chExt cx="0" cy="0"/>
+        </a:xfrm>
+      </p:grpSpPr>
+      <p:sp>
+        <p:nvSpPr>
+          <p:cNvPr id="2" name="Title 1"/>
+          <p:cNvSpPr>
+            <a:spLocks noGrp="1"/>
+          </p:cNvSpPr>
+          <p:nvPr>
+            <p:ph type="title"/>
+          </p:nvPr>
+        </p:nvSpPr>
+        <p:spPr/>
+        <p:txBody>
+          <a:bodyPr/>
+          <a:lstStyle/>
+          <a:p>
+            <a:r>
+              <a:rPr lang="en-US" dirty="0" smtClean="0"/>
+              <a:t>AO40 Replication</a:t>
+            </a:r>
+            <a:endParaRPr lang="en-US" dirty="0"/>
+          </a:p>
+        </p:txBody>
+      </p:sp>
+      <p:pic>
+        <p:nvPicPr>
+          <p:cNvPr id="5" name="Content Placeholder 4"/>
+          <p:cNvPicPr>
+            <a:picLocks noGrp="1" noChangeAspect="1"/>
+          </p:cNvPicPr>
+          <p:nvPr>
+            <p:ph idx="1"/>
+          </p:nvPr>
+        </p:nvPicPr>
+        <p:blipFill>
+          <a:blip r:embed="rId3">
+            <a:extLst>
+              <a:ext uri="{28A0092B-C50C-407E-A947-70E740481C1C}">
+                <a14:useLocalDpi xmlns:a14="http://schemas.microsoft.com/office/drawing/2010/main" val="0"/>
+              </a:ext>
+            </a:extLst>
+          </a:blip>
+          <a:stretch>
+            <a:fillRect/>
+          </a:stretch>
+        </p:blipFill>
+        <p:spPr>
+          <a:xfrm>
+            <a:off x="1980212" y="2362200"/>
+            <a:ext cx="5183575" cy="3886200"/>
+          </a:xfrm>
+        </p:spPr>
+      </p:pic>
+    </p:spTree>
+    <p:extLst>
+      <p:ext uri="{BB962C8B-B14F-4D97-AF65-F5344CB8AC3E}">
+        <p14:creationId xmlns:p14="http://schemas.microsoft.com/office/powerpoint/2010/main" val="2238143723"/>
+      </p:ext>
+    </p:extLst>
+  </p:cSld>
+  <p:clrMapOvr>
+    <a:masterClrMapping/>
+  </p:clrMapOvr>
+</p:sld>
+</file>
+
+<file path=ppt/slides/slide19.xml><?xml version="1.0" encoding="utf-8"?>
+<p:sld xmlns:a="http://schemas.openxmlformats.org/drawingml/2006/main" xmlns:r="http://schemas.openxmlformats.org/officeDocument/2006/relationships" xmlns:p="http://schemas.openxmlformats.org/presentationml/2006/main">
+  <p:cSld>
+    <p:spTree>
+      <p:nvGrpSpPr>
+        <p:cNvPr id="1" name=""/>
+        <p:cNvGrpSpPr/>
+        <p:nvPr/>
+      </p:nvGrpSpPr>
+      <p:grpSpPr>
+        <a:xfrm>
+          <a:off x="0" y="0"/>
+          <a:ext cx="0" cy="0"/>
+          <a:chOff x="0" y="0"/>
+          <a:chExt cx="0" cy="0"/>
+        </a:xfrm>
+      </p:grpSpPr>
+      <p:sp>
+        <p:nvSpPr>
+          <p:cNvPr id="2" name="Title 1"/>
+          <p:cNvSpPr>
+            <a:spLocks noGrp="1"/>
+          </p:cNvSpPr>
+          <p:nvPr>
+            <p:ph type="title"/>
+          </p:nvPr>
+        </p:nvSpPr>
+        <p:spPr/>
+        <p:txBody>
+          <a:bodyPr/>
+          <a:lstStyle/>
+          <a:p>
+            <a:r>
+              <a:rPr lang="en-US" dirty="0" smtClean="0"/>
+              <a:t>AO40 Replication Parameters</a:t>
+            </a:r>
+            <a:endParaRPr lang="en-US" dirty="0"/>
+          </a:p>
+        </p:txBody>
+      </p:sp>
+      <p:graphicFrame>
+        <p:nvGraphicFramePr>
+          <p:cNvPr id="6" name="Content Placeholder 5"/>
+          <p:cNvGraphicFramePr>
+            <a:graphicFrameLocks noGrp="1"/>
+          </p:cNvGraphicFramePr>
+          <p:nvPr>
+            <p:ph idx="1"/>
+            <p:extLst>
+              <p:ext uri="{D42A27DB-BD31-4B8C-83A1-F6EECF244321}">
+                <p14:modId xmlns:p14="http://schemas.microsoft.com/office/powerpoint/2010/main" val="2391690200"/>
+              </p:ext>
+            </p:extLst>
+          </p:nvPr>
+        </p:nvGraphicFramePr>
+        <p:xfrm>
+          <a:off x="457200" y="2362200"/>
+          <a:ext cx="8229600" cy="2225040"/>
+        </p:xfrm>
+        <a:graphic>
+          <a:graphicData uri="http://schemas.openxmlformats.org/drawingml/2006/table">
+            <a:tbl>
+              <a:tblPr firstRow="1" bandRow="1">
+                <a:tableStyleId>{9D7B26C5-4107-4FEC-AEDC-1716B250A1EF}</a:tableStyleId>
+              </a:tblPr>
+              <a:tblGrid>
+                <a:gridCol w="4114800">
+                  <a:extLst>
+                    <a:ext uri="{9D8B030D-6E8A-4147-A177-3AD203B41FA5}">
+                      <a16:colId xmlns:a16="http://schemas.microsoft.com/office/drawing/2014/main" val="515125974"/>
+                    </a:ext>
+                  </a:extLst>
+                </a:gridCol>
+                <a:gridCol w="4114800">
+                  <a:extLst>
+                    <a:ext uri="{9D8B030D-6E8A-4147-A177-3AD203B41FA5}">
+                      <a16:colId xmlns:a16="http://schemas.microsoft.com/office/drawing/2014/main" val="3301782919"/>
+                    </a:ext>
+                  </a:extLst>
+                </a:gridCol>
+              </a:tblGrid>
+              <a:tr h="370840">
+                <a:tc>
+                  <a:txBody>
+                    <a:bodyPr/>
+                    <a:lstStyle/>
+                    <a:p>
+                      <a:endParaRPr lang="en-US" dirty="0"/>
+                    </a:p>
+                  </a:txBody>
+                  <a:tcPr>
+                    <a:solidFill>
+                      <a:srgbClr val="BF5700"/>
+                    </a:solidFill>
+                  </a:tcPr>
+                </a:tc>
+                <a:tc>
+                  <a:txBody>
+                    <a:bodyPr/>
+                    <a:lstStyle/>
+                    <a:p>
+                      <a:endParaRPr lang="en-US" dirty="0"/>
+                    </a:p>
+                  </a:txBody>
+                  <a:tcPr>
+                    <a:solidFill>
+                      <a:srgbClr val="BF5700"/>
+                    </a:solidFill>
+                  </a:tcPr>
+                </a:tc>
+                <a:extLst>
+                  <a:ext uri="{0D108BD9-81ED-4DB2-BD59-A6C34878D82A}">
+                    <a16:rowId xmlns:a16="http://schemas.microsoft.com/office/drawing/2014/main" val="19285068"/>
+                  </a:ext>
+                </a:extLst>
+              </a:tr>
+              <a:tr h="370840">
+                <a:tc>
+                  <a:txBody>
+                    <a:bodyPr/>
+                    <a:lstStyle/>
+                    <a:p>
+                      <a:r>
+                        <a:rPr lang="en-US" dirty="0" smtClean="0">
+                          <a:solidFill>
+                            <a:srgbClr val="404040"/>
+                          </a:solidFill>
+                        </a:rPr>
+                        <a:t>Power Out</a:t>
+                      </a:r>
+                      <a:endParaRPr lang="en-US" dirty="0">
+                        <a:solidFill>
+                          <a:srgbClr val="404040"/>
+                        </a:solidFill>
+                      </a:endParaRPr>
+                    </a:p>
+                  </a:txBody>
+                  <a:tcPr/>
+                </a:tc>
+                <a:tc>
+                  <a:txBody>
+                    <a:bodyPr/>
+                    <a:lstStyle/>
+                    <a:p>
+                      <a:r>
+                        <a:rPr lang="en-US" dirty="0" smtClean="0">
+                          <a:solidFill>
+                            <a:srgbClr val="404040"/>
+                          </a:solidFill>
+                        </a:rPr>
+                        <a:t>30 [</a:t>
+                      </a:r>
+                      <a:r>
+                        <a:rPr lang="en-US" dirty="0" err="1" smtClean="0">
+                          <a:solidFill>
+                            <a:srgbClr val="404040"/>
+                          </a:solidFill>
+                        </a:rPr>
+                        <a:t>dBW</a:t>
+                      </a:r>
+                      <a:r>
+                        <a:rPr lang="en-US" dirty="0" smtClean="0">
+                          <a:solidFill>
+                            <a:srgbClr val="404040"/>
+                          </a:solidFill>
+                        </a:rPr>
+                        <a:t>]</a:t>
+                      </a:r>
+                      <a:endParaRPr lang="en-US" dirty="0">
+                        <a:solidFill>
+                          <a:srgbClr val="404040"/>
+                        </a:solidFill>
+                      </a:endParaRPr>
+                    </a:p>
+                  </a:txBody>
+                  <a:tcPr/>
+                </a:tc>
+                <a:extLst>
+                  <a:ext uri="{0D108BD9-81ED-4DB2-BD59-A6C34878D82A}">
+                    <a16:rowId xmlns:a16="http://schemas.microsoft.com/office/drawing/2014/main" val="1369162485"/>
+                  </a:ext>
+                </a:extLst>
+              </a:tr>
+              <a:tr h="370840">
+                <a:tc>
+                  <a:txBody>
+                    <a:bodyPr/>
+                    <a:lstStyle/>
+                    <a:p>
+                      <a:r>
+                        <a:rPr lang="en-US" dirty="0" smtClean="0">
+                          <a:solidFill>
+                            <a:srgbClr val="404040"/>
+                          </a:solidFill>
+                        </a:rPr>
+                        <a:t>Average Reception Gain</a:t>
+                      </a:r>
+                      <a:endParaRPr lang="en-US" dirty="0">
+                        <a:solidFill>
+                          <a:srgbClr val="404040"/>
+                        </a:solidFill>
+                      </a:endParaRPr>
+                    </a:p>
+                  </a:txBody>
+                  <a:tcPr/>
+                </a:tc>
+                <a:tc>
+                  <a:txBody>
+                    <a:bodyPr/>
+                    <a:lstStyle/>
+                    <a:p>
+                      <a:r>
+                        <a:rPr lang="en-US" dirty="0" smtClean="0">
+                          <a:solidFill>
+                            <a:srgbClr val="404040"/>
+                          </a:solidFill>
+                        </a:rPr>
+                        <a:t>5 [dB]</a:t>
+                      </a:r>
+                    </a:p>
+                  </a:txBody>
+                  <a:tcPr/>
+                </a:tc>
+                <a:extLst>
+                  <a:ext uri="{0D108BD9-81ED-4DB2-BD59-A6C34878D82A}">
+                    <a16:rowId xmlns:a16="http://schemas.microsoft.com/office/drawing/2014/main" val="2791600011"/>
+                  </a:ext>
+                </a:extLst>
+              </a:tr>
+              <a:tr h="370840">
+                <a:tc>
+                  <a:txBody>
+                    <a:bodyPr/>
+                    <a:lstStyle/>
+                    <a:p>
+                      <a:r>
+                        <a:rPr lang="en-US" dirty="0" smtClean="0">
+                          <a:solidFill>
+                            <a:srgbClr val="404040"/>
+                          </a:solidFill>
+                        </a:rPr>
+                        <a:t>System Temperature</a:t>
+                      </a:r>
+                      <a:endParaRPr lang="en-US" dirty="0">
+                        <a:solidFill>
+                          <a:srgbClr val="404040"/>
+                        </a:solidFill>
+                      </a:endParaRPr>
+                    </a:p>
+                  </a:txBody>
+                  <a:tcPr/>
+                </a:tc>
+                <a:tc>
+                  <a:txBody>
+                    <a:bodyPr/>
+                    <a:lstStyle/>
+                    <a:p>
+                      <a:r>
+                        <a:rPr lang="en-US" dirty="0" smtClean="0">
+                          <a:solidFill>
+                            <a:srgbClr val="404040"/>
+                          </a:solidFill>
+                        </a:rPr>
+                        <a:t>190 [K]</a:t>
+                      </a:r>
+                      <a:endParaRPr lang="en-US" dirty="0">
+                        <a:solidFill>
+                          <a:srgbClr val="404040"/>
+                        </a:solidFill>
+                      </a:endParaRPr>
+                    </a:p>
+                  </a:txBody>
+                  <a:tcPr/>
+                </a:tc>
+                <a:extLst>
+                  <a:ext uri="{0D108BD9-81ED-4DB2-BD59-A6C34878D82A}">
+                    <a16:rowId xmlns:a16="http://schemas.microsoft.com/office/drawing/2014/main" val="2928184673"/>
+                  </a:ext>
+                </a:extLst>
+              </a:tr>
+              <a:tr h="370840">
+                <a:tc>
+                  <a:txBody>
+                    <a:bodyPr/>
+                    <a:lstStyle/>
+                    <a:p>
+                      <a:r>
+                        <a:rPr lang="en-US" dirty="0" smtClean="0">
+                          <a:solidFill>
+                            <a:srgbClr val="404040"/>
+                          </a:solidFill>
+                        </a:rPr>
+                        <a:t>Reception Losses</a:t>
+                      </a:r>
+                      <a:endParaRPr lang="en-US" dirty="0">
+                        <a:solidFill>
+                          <a:srgbClr val="404040"/>
+                        </a:solidFill>
+                      </a:endParaRPr>
+                    </a:p>
+                  </a:txBody>
+                  <a:tcPr/>
+                </a:tc>
+                <a:tc>
+                  <a:txBody>
+                    <a:bodyPr/>
+                    <a:lstStyle/>
+                    <a:p>
+                      <a:r>
+                        <a:rPr lang="en-US" dirty="0" smtClean="0">
+                          <a:solidFill>
+                            <a:srgbClr val="404040"/>
+                          </a:solidFill>
+                        </a:rPr>
+                        <a:t>-4.5 [dB]</a:t>
+                      </a:r>
+                      <a:endParaRPr lang="en-US" dirty="0">
+                        <a:solidFill>
+                          <a:srgbClr val="404040"/>
+                        </a:solidFill>
+                      </a:endParaRPr>
+                    </a:p>
+                  </a:txBody>
+                  <a:tcPr/>
+                </a:tc>
+                <a:extLst>
+                  <a:ext uri="{0D108BD9-81ED-4DB2-BD59-A6C34878D82A}">
+                    <a16:rowId xmlns:a16="http://schemas.microsoft.com/office/drawing/2014/main" val="1288783968"/>
+                  </a:ext>
+                </a:extLst>
+              </a:tr>
+              <a:tr h="370840">
+                <a:tc>
+                  <a:txBody>
+                    <a:bodyPr/>
+                    <a:lstStyle/>
+                    <a:p>
+                      <a:r>
+                        <a:rPr lang="en-US" dirty="0" smtClean="0">
+                          <a:solidFill>
+                            <a:srgbClr val="404040"/>
+                          </a:solidFill>
+                        </a:rPr>
+                        <a:t>Tracking Threshold</a:t>
+                      </a:r>
+                      <a:endParaRPr lang="en-US" dirty="0">
+                        <a:solidFill>
+                          <a:srgbClr val="404040"/>
+                        </a:solidFill>
+                      </a:endParaRPr>
+                    </a:p>
+                  </a:txBody>
+                  <a:tcPr/>
+                </a:tc>
+                <a:tc>
+                  <a:txBody>
+                    <a:bodyPr/>
+                    <a:lstStyle/>
+                    <a:p>
+                      <a:r>
+                        <a:rPr lang="en-US" dirty="0" smtClean="0">
+                          <a:solidFill>
+                            <a:srgbClr val="404040"/>
+                          </a:solidFill>
+                        </a:rPr>
+                        <a:t>40 (25) [</a:t>
+                      </a:r>
+                      <a:r>
+                        <a:rPr lang="en-US" dirty="0" err="1" smtClean="0">
+                          <a:solidFill>
+                            <a:srgbClr val="404040"/>
+                          </a:solidFill>
+                        </a:rPr>
+                        <a:t>db</a:t>
+                      </a:r>
+                      <a:r>
+                        <a:rPr lang="en-US" dirty="0" smtClean="0">
+                          <a:solidFill>
+                            <a:srgbClr val="404040"/>
+                          </a:solidFill>
+                        </a:rPr>
+                        <a:t>-Hz]</a:t>
+                      </a:r>
+                      <a:endParaRPr lang="en-US" dirty="0">
+                        <a:solidFill>
+                          <a:srgbClr val="404040"/>
+                        </a:solidFill>
+                      </a:endParaRPr>
+                    </a:p>
+                  </a:txBody>
+                  <a:tcPr/>
+                </a:tc>
+                <a:extLst>
+                  <a:ext uri="{0D108BD9-81ED-4DB2-BD59-A6C34878D82A}">
+                    <a16:rowId xmlns:a16="http://schemas.microsoft.com/office/drawing/2014/main" val="3806107581"/>
+                  </a:ext>
+                </a:extLst>
+              </a:tr>
+            </a:tbl>
+          </a:graphicData>
+        </a:graphic>
+      </p:graphicFrame>
+    </p:spTree>
+    <p:extLst>
+      <p:ext uri="{BB962C8B-B14F-4D97-AF65-F5344CB8AC3E}">
+        <p14:creationId xmlns:p14="http://schemas.microsoft.com/office/powerpoint/2010/main" val="1845694825"/>
+      </p:ext>
+    </p:extLst>
+  </p:cSld>
+  <p:clrMapOvr>
+    <a:masterClrMapping/>
+  </p:clrMapOvr>
+</p:sld>
+</file>
+
+<file path=ppt/slides/slide2.xml><?xml version="1.0" encoding="utf-8"?>
+<p:sld xmlns:a="http://schemas.openxmlformats.org/drawingml/2006/main" xmlns:r="http://schemas.openxmlformats.org/officeDocument/2006/relationships" xmlns:p="http://schemas.openxmlformats.org/presentationml/2006/main">
+  <p:cSld>
+    <p:spTree>
+      <p:nvGrpSpPr>
+        <p:cNvPr id="1" name=""/>
+        <p:cNvGrpSpPr/>
+        <p:nvPr/>
+      </p:nvGrpSpPr>
+      <p:grpSpPr>
+        <a:xfrm>
+          <a:off x="0" y="0"/>
+          <a:ext cx="0" cy="0"/>
+          <a:chOff x="0" y="0"/>
+          <a:chExt cx="0" cy="0"/>
+        </a:xfrm>
+      </p:grpSpPr>
+      <p:sp>
+        <p:nvSpPr>
+          <p:cNvPr id="4" name="Title 3"/>
+          <p:cNvSpPr>
+            <a:spLocks noGrp="1"/>
+          </p:cNvSpPr>
+          <p:nvPr>
+            <p:ph type="title"/>
+          </p:nvPr>
+        </p:nvSpPr>
+        <p:spPr/>
+        <p:txBody>
+          <a:bodyPr>
+            <a:normAutofit/>
+          </a:bodyPr>
+          <a:lstStyle/>
+          <a:p>
+            <a:r>
+              <a:rPr lang="en-US" sz="3200" dirty="0"/>
+              <a:t>Feasibility of Using GPS in Space</a:t>
+            </a:r>
+          </a:p>
+        </p:txBody>
+      </p:sp>
+      <p:sp>
+        <p:nvSpPr>
+          <p:cNvPr id="7" name="Text Placeholder 6"/>
+          <p:cNvSpPr>
+            <a:spLocks noGrp="1"/>
+          </p:cNvSpPr>
+          <p:nvPr>
+            <p:ph type="body" idx="1"/>
+          </p:nvPr>
+        </p:nvSpPr>
+        <p:spPr/>
+        <p:txBody>
+          <a:bodyPr/>
+          <a:lstStyle/>
+          <a:p>
+            <a:r>
+              <a:rPr lang="en-US" dirty="0" smtClean="0"/>
+              <a:t>Will my GPS receiver work on the moon?</a:t>
+            </a:r>
+            <a:endParaRPr lang="en-US" dirty="0"/>
+          </a:p>
+        </p:txBody>
+      </p:sp>
+    </p:spTree>
+    <p:extLst>
+      <p:ext uri="{BB962C8B-B14F-4D97-AF65-F5344CB8AC3E}">
+        <p14:creationId xmlns:p14="http://schemas.microsoft.com/office/powerpoint/2010/main" val="3546363692"/>
+      </p:ext>
+    </p:extLst>
+  </p:cSld>
+  <p:clrMapOvr>
+    <a:masterClrMapping/>
+  </p:clrMapOvr>
+  <p:timing>
+    <p:tnLst>
+      <p:par>
+        <p:cTn id="1" dur="indefinite" restart="never" nodeType="tmRoot"/>
+      </p:par>
+    </p:tnLst>
+  </p:timing>
+</p:sld>
+</file>
+
+<file path=ppt/slides/slide20.xml><?xml version="1.0" encoding="utf-8"?>
+<p:sld xmlns:a="http://schemas.openxmlformats.org/drawingml/2006/main" xmlns:r="http://schemas.openxmlformats.org/officeDocument/2006/relationships" xmlns:p="http://schemas.openxmlformats.org/presentationml/2006/main">
+  <p:cSld>
+    <p:spTree>
+      <p:nvGrpSpPr>
+        <p:cNvPr id="1" name=""/>
+        <p:cNvGrpSpPr/>
+        <p:nvPr/>
+      </p:nvGrpSpPr>
+      <p:grpSpPr>
+        <a:xfrm>
+          <a:off x="0" y="0"/>
+          <a:ext cx="0" cy="0"/>
+          <a:chOff x="0" y="0"/>
+          <a:chExt cx="0" cy="0"/>
+        </a:xfrm>
+      </p:grpSpPr>
+      <p:sp>
+        <p:nvSpPr>
+          <p:cNvPr id="4" name="Title 3"/>
+          <p:cNvSpPr>
+            <a:spLocks noGrp="1"/>
+          </p:cNvSpPr>
+          <p:nvPr>
+            <p:ph type="title"/>
+          </p:nvPr>
+        </p:nvSpPr>
+        <p:spPr/>
+        <p:txBody>
+          <a:bodyPr/>
+          <a:lstStyle/>
+          <a:p>
+            <a:r>
+              <a:rPr lang="en-US" dirty="0" smtClean="0"/>
+              <a:t>Conclusions</a:t>
+            </a:r>
+            <a:endParaRPr lang="en-US" dirty="0"/>
+          </a:p>
+        </p:txBody>
+      </p:sp>
+      <p:sp>
+        <p:nvSpPr>
+          <p:cNvPr id="5" name="Text Placeholder 4"/>
+          <p:cNvSpPr>
+            <a:spLocks noGrp="1"/>
+          </p:cNvSpPr>
+          <p:nvPr>
+            <p:ph type="body" idx="1"/>
+          </p:nvPr>
+        </p:nvSpPr>
+        <p:spPr/>
+        <p:txBody>
+          <a:bodyPr/>
+          <a:lstStyle/>
+          <a:p>
+            <a:endParaRPr lang="en-US"/>
+          </a:p>
+        </p:txBody>
+      </p:sp>
+    </p:spTree>
+    <p:extLst>
+      <p:ext uri="{BB962C8B-B14F-4D97-AF65-F5344CB8AC3E}">
+        <p14:creationId xmlns:p14="http://schemas.microsoft.com/office/powerpoint/2010/main" val="1583679842"/>
+      </p:ext>
+    </p:extLst>
+  </p:cSld>
+  <p:clrMapOvr>
+    <a:masterClrMapping/>
+  </p:clrMapOvr>
+</p:sld>
+</file>
+
+<file path=ppt/slides/slide21.xml><?xml version="1.0" encoding="utf-8"?>
+<p:sld xmlns:a="http://schemas.openxmlformats.org/drawingml/2006/main" xmlns:r="http://schemas.openxmlformats.org/officeDocument/2006/relationships" xmlns:p="http://schemas.openxmlformats.org/presentationml/2006/main">
+  <p:cSld>
+    <p:spTree>
+      <p:nvGrpSpPr>
+        <p:cNvPr id="1" name=""/>
+        <p:cNvGrpSpPr/>
+        <p:nvPr/>
+      </p:nvGrpSpPr>
+      <p:grpSpPr>
+        <a:xfrm>
+          <a:off x="0" y="0"/>
+          <a:ext cx="0" cy="0"/>
+          <a:chOff x="0" y="0"/>
+          <a:chExt cx="0" cy="0"/>
+        </a:xfrm>
+      </p:grpSpPr>
+      <p:sp>
+        <p:nvSpPr>
+          <p:cNvPr id="4" name="Title 3"/>
+          <p:cNvSpPr>
+            <a:spLocks noGrp="1"/>
+          </p:cNvSpPr>
+          <p:nvPr>
+            <p:ph type="title"/>
+          </p:nvPr>
+        </p:nvSpPr>
+        <p:spPr/>
+        <p:txBody>
+          <a:bodyPr/>
+          <a:lstStyle/>
+          <a:p>
+            <a:r>
+              <a:rPr lang="en-US" dirty="0" smtClean="0"/>
+              <a:t>Observability</a:t>
+            </a:r>
+            <a:endParaRPr lang="en-US" dirty="0"/>
+          </a:p>
+        </p:txBody>
+      </p:sp>
+      <p:sp>
+        <p:nvSpPr>
+          <p:cNvPr id="5" name="Content Placeholder 4"/>
+          <p:cNvSpPr>
+            <a:spLocks noGrp="1"/>
+          </p:cNvSpPr>
+          <p:nvPr>
+            <p:ph idx="1"/>
+          </p:nvPr>
+        </p:nvSpPr>
+        <p:spPr/>
+        <p:txBody>
+          <a:bodyPr/>
+          <a:lstStyle/>
+          <a:p>
+            <a:r>
+              <a:rPr lang="en-US" dirty="0" smtClean="0"/>
+              <a:t>Satellite Geometry</a:t>
+            </a:r>
+          </a:p>
+          <a:p>
+            <a:r>
+              <a:rPr lang="en-US" dirty="0" smtClean="0"/>
+              <a:t>Receiver Parameters</a:t>
+            </a:r>
+            <a:endParaRPr lang="en-US" dirty="0"/>
+          </a:p>
+        </p:txBody>
+      </p:sp>
+    </p:spTree>
+    <p:extLst>
+      <p:ext uri="{BB962C8B-B14F-4D97-AF65-F5344CB8AC3E}">
+        <p14:creationId xmlns:p14="http://schemas.microsoft.com/office/powerpoint/2010/main" val="3371245903"/>
+      </p:ext>
+    </p:extLst>
+  </p:cSld>
+  <p:clrMapOvr>
+    <a:masterClrMapping/>
+  </p:clrMapOvr>
+</p:sld>
+</file>
+
+<file path=ppt/slides/slide22.xml><?xml version="1.0" encoding="utf-8"?>
+<p:sld xmlns:a="http://schemas.openxmlformats.org/drawingml/2006/main" xmlns:r="http://schemas.openxmlformats.org/officeDocument/2006/relationships" xmlns:p="http://schemas.openxmlformats.org/presentationml/2006/main">
+  <p:cSld>
+    <p:spTree>
+      <p:nvGrpSpPr>
+        <p:cNvPr id="1" name=""/>
+        <p:cNvGrpSpPr/>
+        <p:nvPr/>
+      </p:nvGrpSpPr>
+      <p:grpSpPr>
+        <a:xfrm>
+          <a:off x="0" y="0"/>
+          <a:ext cx="0" cy="0"/>
+          <a:chOff x="0" y="0"/>
+          <a:chExt cx="0" cy="0"/>
+        </a:xfrm>
+      </p:grpSpPr>
+      <p:sp>
+        <p:nvSpPr>
+          <p:cNvPr id="2" name="Title 1"/>
+          <p:cNvSpPr>
+            <a:spLocks noGrp="1"/>
+          </p:cNvSpPr>
+          <p:nvPr>
+            <p:ph type="title"/>
+          </p:nvPr>
+        </p:nvSpPr>
+        <p:spPr/>
+        <p:txBody>
+          <a:bodyPr/>
+          <a:lstStyle/>
+          <a:p>
+            <a:r>
+              <a:rPr lang="en-US" dirty="0" smtClean="0"/>
               <a:t>Possible Reach</a:t>
             </a:r>
             <a:endParaRPr lang="en-US" dirty="0"/>
@@ -4867,7 +6606,7 @@
 </p:sld>
 </file>
 
-<file path=ppt/slides/slide18.xml><?xml version="1.0" encoding="utf-8"?>
+<file path=ppt/slides/slide23.xml><?xml version="1.0" encoding="utf-8"?>
 <p:sld xmlns:a="http://schemas.openxmlformats.org/drawingml/2006/main" xmlns:r="http://schemas.openxmlformats.org/officeDocument/2006/relationships" xmlns:p="http://schemas.openxmlformats.org/presentationml/2006/main">
   <p:cSld>
     <p:spTree>
@@ -5132,7 +6871,7 @@
 </p:sld>
 </file>
 
-<file path=ppt/slides/slide2.xml><?xml version="1.0" encoding="utf-8"?>
+<file path=ppt/slides/slide24.xml><?xml version="1.0" encoding="utf-8"?>
 <p:sld xmlns:a="http://schemas.openxmlformats.org/drawingml/2006/main" xmlns:r="http://schemas.openxmlformats.org/officeDocument/2006/relationships" xmlns:p="http://schemas.openxmlformats.org/presentationml/2006/main">
   <p:cSld>
     <p:spTree>
@@ -5151,7 +6890,7 @@
       </p:grpSpPr>
       <p:sp>
         <p:nvSpPr>
-          <p:cNvPr id="4" name="Title 3"/>
+          <p:cNvPr id="2" name="Title 1"/>
           <p:cNvSpPr>
             <a:spLocks noGrp="1"/>
           </p:cNvSpPr>
@@ -5161,58 +6900,217 @@
         </p:nvSpPr>
         <p:spPr/>
         <p:txBody>
+          <a:bodyPr/>
+          <a:lstStyle/>
+          <a:p>
+            <a:r>
+              <a:rPr lang="en-US" dirty="0" smtClean="0"/>
+              <a:t>References</a:t>
+            </a:r>
+            <a:endParaRPr lang="en-US" dirty="0"/>
+          </a:p>
+        </p:txBody>
+      </p:sp>
+      <p:sp>
+        <p:nvSpPr>
+          <p:cNvPr id="3" name="Content Placeholder 2"/>
+          <p:cNvSpPr>
+            <a:spLocks noGrp="1"/>
+          </p:cNvSpPr>
+          <p:nvPr>
+            <p:ph idx="1"/>
+          </p:nvPr>
+        </p:nvSpPr>
+        <p:spPr/>
+        <p:txBody>
           <a:bodyPr>
-            <a:normAutofit/>
+            <a:normAutofit fontScale="40000" lnSpcReduction="20000"/>
           </a:bodyPr>
           <a:lstStyle/>
           <a:p>
             <a:r>
-              <a:rPr lang="en-US" sz="3200" dirty="0"/>
-              <a:t>Feasibility of Using GPS in Space</a:t>
-            </a:r>
-          </a:p>
-        </p:txBody>
-      </p:sp>
-      <p:sp>
-        <p:nvSpPr>
-          <p:cNvPr id="7" name="Text Placeholder 6"/>
-          <p:cNvSpPr>
-            <a:spLocks noGrp="1"/>
-          </p:cNvSpPr>
-          <p:nvPr>
-            <p:ph type="body" idx="1"/>
-          </p:nvPr>
-        </p:nvSpPr>
-        <p:spPr/>
-        <p:txBody>
-          <a:bodyPr/>
-          <a:lstStyle/>
-          <a:p>
-            <a:r>
-              <a:rPr lang="en-US" dirty="0" smtClean="0"/>
-              <a:t>Will my GPS receiver work on the moon?</a:t>
-            </a:r>
+              <a:rPr lang="en-US" dirty="0"/>
+              <a:t>P. </a:t>
+            </a:r>
+            <a:r>
+              <a:rPr lang="en-US" dirty="0" err="1"/>
+              <a:t>Misra</a:t>
+            </a:r>
+            <a:r>
+              <a:rPr lang="en-US" dirty="0"/>
+              <a:t> and P. </a:t>
+            </a:r>
+            <a:r>
+              <a:rPr lang="en-US" dirty="0" err="1"/>
+              <a:t>Enge</a:t>
+            </a:r>
+            <a:r>
+              <a:rPr lang="en-US" dirty="0"/>
+              <a:t>. </a:t>
+            </a:r>
+            <a:r>
+              <a:rPr lang="en-US" i="1" dirty="0"/>
+              <a:t>Global Positioning Systems</a:t>
+            </a:r>
+            <a:r>
+              <a:rPr lang="en-US" dirty="0"/>
+              <a:t>. Lincoln, Massachusetts: Ganga-</a:t>
+            </a:r>
+            <a:r>
+              <a:rPr lang="en-US" dirty="0" err="1"/>
+              <a:t>Jumana</a:t>
+            </a:r>
+            <a:r>
+              <a:rPr lang="en-US" dirty="0"/>
+              <a:t> Press, revised second ed., 2012.</a:t>
+            </a:r>
+          </a:p>
+          <a:p>
             <a:endParaRPr lang="en-US" dirty="0"/>
+          </a:p>
+          <a:p>
+            <a:r>
+              <a:rPr lang="en-US" dirty="0"/>
+              <a:t>F. Bauer. </a:t>
+            </a:r>
+            <a:r>
+              <a:rPr lang="en-US" i="1" dirty="0"/>
+              <a:t>GPS Space Service Volume</a:t>
+            </a:r>
+            <a:r>
+              <a:rPr lang="en-US" dirty="0"/>
+              <a:t>. PNT Advisory Board Meeting, NASA. June 11, 2015.</a:t>
+            </a:r>
+          </a:p>
+          <a:p>
+            <a:endParaRPr lang="en-US" dirty="0"/>
+          </a:p>
+          <a:p>
+            <a:r>
+              <a:rPr lang="en-US" dirty="0"/>
+              <a:t>T. </a:t>
+            </a:r>
+            <a:r>
+              <a:rPr lang="en-US" dirty="0" err="1"/>
+              <a:t>Ebinuma</a:t>
+            </a:r>
+            <a:r>
+              <a:rPr lang="en-US" dirty="0"/>
+              <a:t> and M. Unwin. </a:t>
+            </a:r>
+            <a:r>
+              <a:rPr lang="en-US" i="1" dirty="0"/>
+              <a:t>GPS Receiver Demonstration on a Galileo Test Bed Satellite</a:t>
+            </a:r>
+            <a:r>
+              <a:rPr lang="en-US" dirty="0"/>
+              <a:t>.  The Journal of Navigation, The Royal Institute of Navigation. Pages 349-362, Vol. 60, No. 3, September 2007.</a:t>
+            </a:r>
+          </a:p>
+          <a:p>
+            <a:endParaRPr lang="en-US" dirty="0"/>
+          </a:p>
+          <a:p>
+            <a:r>
+              <a:rPr lang="en-US" dirty="0"/>
+              <a:t>O. </a:t>
+            </a:r>
+            <a:r>
+              <a:rPr lang="en-US" dirty="0" err="1"/>
+              <a:t>Montenbruck</a:t>
+            </a:r>
+            <a:r>
+              <a:rPr lang="en-US" dirty="0"/>
+              <a:t> et al. </a:t>
+            </a:r>
+            <a:r>
+              <a:rPr lang="en-US" i="1" dirty="0"/>
+              <a:t>GNSS Satellite Geometry and Attitude Models</a:t>
+            </a:r>
+            <a:r>
+              <a:rPr lang="en-US" dirty="0"/>
+              <a:t>. Advances in Space Research. Pages 1015-1029, Vol 56, 2015.</a:t>
+            </a:r>
+          </a:p>
+          <a:p>
+            <a:endParaRPr lang="en-US" dirty="0"/>
+          </a:p>
+          <a:p>
+            <a:r>
+              <a:rPr lang="en-US" dirty="0"/>
+              <a:t>J. </a:t>
+            </a:r>
+            <a:r>
+              <a:rPr lang="en-US" dirty="0" err="1"/>
+              <a:t>Kronman</a:t>
+            </a:r>
+            <a:r>
+              <a:rPr lang="en-US" dirty="0"/>
+              <a:t>. </a:t>
+            </a:r>
+            <a:r>
+              <a:rPr lang="en-US" i="1" dirty="0"/>
+              <a:t>Experience Using GPS For Orbit Determination of a Geosynchronous Satellite</a:t>
+            </a:r>
+            <a:r>
+              <a:rPr lang="en-US" dirty="0"/>
+              <a:t>. GPS 2000, Institute of Navigation. Pages 1622-1626, September 2000.</a:t>
+            </a:r>
+          </a:p>
+          <a:p>
+            <a:endParaRPr lang="en-US" dirty="0"/>
+          </a:p>
+          <a:p>
+            <a:r>
+              <a:rPr lang="en-US" dirty="0"/>
+              <a:t>M. Moreau et al. </a:t>
+            </a:r>
+            <a:r>
+              <a:rPr lang="en-US" i="1" dirty="0"/>
+              <a:t>Results from the GPS Flight Experiment on the High Earth Orbit AMSAT Oscar-40 Spacecraft</a:t>
+            </a:r>
+            <a:r>
+              <a:rPr lang="en-US" dirty="0"/>
+              <a:t>. GPS 2002, Institute of Navigation. September 2002.</a:t>
+            </a:r>
+          </a:p>
+          <a:p>
+            <a:endParaRPr lang="en-US" dirty="0"/>
+          </a:p>
+          <a:p>
+            <a:r>
+              <a:rPr lang="en-US" dirty="0"/>
+              <a:t>W. Marquis and D. </a:t>
+            </a:r>
+            <a:r>
+              <a:rPr lang="en-US" dirty="0" err="1"/>
+              <a:t>Reigh</a:t>
+            </a:r>
+            <a:r>
+              <a:rPr lang="en-US" dirty="0"/>
+              <a:t>. </a:t>
+            </a:r>
+            <a:r>
+              <a:rPr lang="en-US" i="1" dirty="0"/>
+              <a:t>The GPS Block IIR and IIR-M Broadcast L-band Antenna Panel</a:t>
+            </a:r>
+            <a:r>
+              <a:rPr lang="en-US" dirty="0"/>
+              <a:t>. Navigation, Institute of Navigation. Pages 329-347, Vol. 62, Issue 4, Winter 2015.</a:t>
+            </a:r>
           </a:p>
         </p:txBody>
       </p:sp>
     </p:spTree>
     <p:extLst>
       <p:ext uri="{BB962C8B-B14F-4D97-AF65-F5344CB8AC3E}">
-        <p14:creationId xmlns:p14="http://schemas.microsoft.com/office/powerpoint/2010/main" val="3546363692"/>
+        <p14:creationId xmlns:p14="http://schemas.microsoft.com/office/powerpoint/2010/main" val="2985745175"/>
       </p:ext>
     </p:extLst>
   </p:cSld>
   <p:clrMapOvr>
     <a:masterClrMapping/>
   </p:clrMapOvr>
-  <p:timing>
-    <p:tnLst>
-      <p:par>
-        <p:cTn id="1" dur="indefinite" restart="never" nodeType="tmRoot"/>
-      </p:par>
-    </p:tnLst>
-  </p:timing>
 </p:sld>
 </file>
 
@@ -5704,7 +7602,7 @@
           <p:nvPr/>
         </p:nvPicPr>
         <p:blipFill>
-          <a:blip r:embed="rId2">
+          <a:blip r:embed="rId3">
             <a:extLst>
               <a:ext uri="{28A0092B-C50C-407E-A947-70E740481C1C}">
                 <a14:useLocalDpi xmlns:a14="http://schemas.microsoft.com/office/drawing/2010/main" val="0"/>
@@ -5734,7 +7632,7 @@
           <p:nvPr/>
         </p:nvPicPr>
         <p:blipFill>
-          <a:blip r:embed="rId3">
+          <a:blip r:embed="rId4">
             <a:extLst>
               <a:ext uri="{28A0092B-C50C-407E-A947-70E740481C1C}">
                 <a14:useLocalDpi xmlns:a14="http://schemas.microsoft.com/office/drawing/2010/main" val="0"/>

</xml_diff>